<commit_message>
* Added DSML for MADARA   * Currently only for visually modeling MADARA applications and showing semantic relationships   * Interpreters for generating C++ will be added soon   * Interpreters for generating Java may take longer   * Added icon files and templates for later updates to the DSML * Looking for people to test the aggregate update filters for accuracy and any type of bugs or additional features that may be required (contact jedmondson@gmail.com) * Updated to version 1.2.0
git-svn-id: http://madara.googlecode.com/svn/trunk@1065 2850746a-f1c8-11dd-b507-8b4ecd5210be
</commit_message>
<xml_diff>
--- a/modeling/Icons/MADARA.pptx
+++ b/modeling/Icons/MADARA.pptx
@@ -6,6 +6,7 @@
   </p:sldMasterIdLst>
   <p:sldIdLst>
     <p:sldId id="257" r:id="rId2"/>
+    <p:sldId id="258" r:id="rId3"/>
   </p:sldIdLst>
   <p:sldSz cx="9144000" cy="6858000" type="screen4x3"/>
   <p:notesSz cx="6858000" cy="9144000"/>
@@ -288,7 +289,7 @@
           <a:p>
             <a:fld id="{0CBF2418-F932-494B-8DFE-1089D95A0ED5}" type="datetimeFigureOut">
               <a:rPr lang="en-US" smtClean="0"/>
-              <a:t>11/10/2013</a:t>
+              <a:t>11/13/2013</a:t>
             </a:fld>
             <a:endParaRPr lang="en-US"/>
           </a:p>
@@ -458,7 +459,7 @@
           <a:p>
             <a:fld id="{0CBF2418-F932-494B-8DFE-1089D95A0ED5}" type="datetimeFigureOut">
               <a:rPr lang="en-US" smtClean="0"/>
-              <a:t>11/10/2013</a:t>
+              <a:t>11/13/2013</a:t>
             </a:fld>
             <a:endParaRPr lang="en-US"/>
           </a:p>
@@ -638,7 +639,7 @@
           <a:p>
             <a:fld id="{0CBF2418-F932-494B-8DFE-1089D95A0ED5}" type="datetimeFigureOut">
               <a:rPr lang="en-US" smtClean="0"/>
-              <a:t>11/10/2013</a:t>
+              <a:t>11/13/2013</a:t>
             </a:fld>
             <a:endParaRPr lang="en-US"/>
           </a:p>
@@ -808,7 +809,7 @@
           <a:p>
             <a:fld id="{0CBF2418-F932-494B-8DFE-1089D95A0ED5}" type="datetimeFigureOut">
               <a:rPr lang="en-US" smtClean="0"/>
-              <a:t>11/10/2013</a:t>
+              <a:t>11/13/2013</a:t>
             </a:fld>
             <a:endParaRPr lang="en-US"/>
           </a:p>
@@ -1054,7 +1055,7 @@
           <a:p>
             <a:fld id="{0CBF2418-F932-494B-8DFE-1089D95A0ED5}" type="datetimeFigureOut">
               <a:rPr lang="en-US" smtClean="0"/>
-              <a:t>11/10/2013</a:t>
+              <a:t>11/13/2013</a:t>
             </a:fld>
             <a:endParaRPr lang="en-US"/>
           </a:p>
@@ -1342,7 +1343,7 @@
           <a:p>
             <a:fld id="{0CBF2418-F932-494B-8DFE-1089D95A0ED5}" type="datetimeFigureOut">
               <a:rPr lang="en-US" smtClean="0"/>
-              <a:t>11/10/2013</a:t>
+              <a:t>11/13/2013</a:t>
             </a:fld>
             <a:endParaRPr lang="en-US"/>
           </a:p>
@@ -1764,7 +1765,7 @@
           <a:p>
             <a:fld id="{0CBF2418-F932-494B-8DFE-1089D95A0ED5}" type="datetimeFigureOut">
               <a:rPr lang="en-US" smtClean="0"/>
-              <a:t>11/10/2013</a:t>
+              <a:t>11/13/2013</a:t>
             </a:fld>
             <a:endParaRPr lang="en-US"/>
           </a:p>
@@ -1882,7 +1883,7 @@
           <a:p>
             <a:fld id="{0CBF2418-F932-494B-8DFE-1089D95A0ED5}" type="datetimeFigureOut">
               <a:rPr lang="en-US" smtClean="0"/>
-              <a:t>11/10/2013</a:t>
+              <a:t>11/13/2013</a:t>
             </a:fld>
             <a:endParaRPr lang="en-US"/>
           </a:p>
@@ -1977,7 +1978,7 @@
           <a:p>
             <a:fld id="{0CBF2418-F932-494B-8DFE-1089D95A0ED5}" type="datetimeFigureOut">
               <a:rPr lang="en-US" smtClean="0"/>
-              <a:t>11/10/2013</a:t>
+              <a:t>11/13/2013</a:t>
             </a:fld>
             <a:endParaRPr lang="en-US"/>
           </a:p>
@@ -2254,7 +2255,7 @@
           <a:p>
             <a:fld id="{0CBF2418-F932-494B-8DFE-1089D95A0ED5}" type="datetimeFigureOut">
               <a:rPr lang="en-US" smtClean="0"/>
-              <a:t>11/10/2013</a:t>
+              <a:t>11/13/2013</a:t>
             </a:fld>
             <a:endParaRPr lang="en-US"/>
           </a:p>
@@ -2507,7 +2508,7 @@
           <a:p>
             <a:fld id="{0CBF2418-F932-494B-8DFE-1089D95A0ED5}" type="datetimeFigureOut">
               <a:rPr lang="en-US" smtClean="0"/>
-              <a:t>11/10/2013</a:t>
+              <a:t>11/13/2013</a:t>
             </a:fld>
             <a:endParaRPr lang="en-US"/>
           </a:p>
@@ -2720,7 +2721,7 @@
           <a:p>
             <a:fld id="{0CBF2418-F932-494B-8DFE-1089D95A0ED5}" type="datetimeFigureOut">
               <a:rPr lang="en-US" smtClean="0"/>
-              <a:t>11/10/2013</a:t>
+              <a:t>11/13/2013</a:t>
             </a:fld>
             <a:endParaRPr lang="en-US"/>
           </a:p>
@@ -3097,18 +3098,21 @@
       </p:grpSpPr>
       <p:sp>
         <p:nvSpPr>
-          <p:cNvPr id="38" name="Right Arrow 37"/>
-          <p:cNvSpPr/>
-          <p:nvPr/>
-        </p:nvSpPr>
-        <p:spPr>
-          <a:xfrm>
-            <a:off x="4165353" y="1852472"/>
-            <a:ext cx="1371600" cy="381000"/>
+          <p:cNvPr id="42" name="Right Arrow 41"/>
+          <p:cNvSpPr/>
+          <p:nvPr/>
+        </p:nvSpPr>
+        <p:spPr>
+          <a:xfrm rot="5400000">
+            <a:off x="4852850" y="4686161"/>
+            <a:ext cx="283770" cy="249907"/>
           </a:xfrm>
           <a:prstGeom prst="rightArrow">
             <a:avLst/>
           </a:prstGeom>
+          <a:solidFill>
+            <a:srgbClr val="FFC000"/>
+          </a:solidFill>
           <a:ln>
             <a:solidFill>
               <a:schemeClr val="tx1"/>
@@ -3142,13 +3146,13 @@
       </p:sp>
       <p:sp>
         <p:nvSpPr>
-          <p:cNvPr id="37" name="Right Arrow 36"/>
-          <p:cNvSpPr/>
-          <p:nvPr/>
-        </p:nvSpPr>
-        <p:spPr>
-          <a:xfrm>
-            <a:off x="2424590" y="1796618"/>
+          <p:cNvPr id="38" name="Right Arrow 37"/>
+          <p:cNvSpPr/>
+          <p:nvPr/>
+        </p:nvSpPr>
+        <p:spPr>
+          <a:xfrm>
+            <a:off x="4165353" y="1852472"/>
             <a:ext cx="1371600" cy="381000"/>
           </a:xfrm>
           <a:prstGeom prst="rightArrow">
@@ -3182,6 +3186,55 @@
           <a:p>
             <a:pPr algn="ctr"/>
             <a:endParaRPr lang="en-US"/>
+          </a:p>
+        </p:txBody>
+      </p:sp>
+      <p:sp>
+        <p:nvSpPr>
+          <p:cNvPr id="37" name="Right Arrow 36"/>
+          <p:cNvSpPr/>
+          <p:nvPr/>
+        </p:nvSpPr>
+        <p:spPr>
+          <a:xfrm>
+            <a:off x="2424590" y="1796618"/>
+            <a:ext cx="1371600" cy="381000"/>
+          </a:xfrm>
+          <a:prstGeom prst="rightArrow">
+            <a:avLst/>
+          </a:prstGeom>
+          <a:ln>
+            <a:solidFill>
+              <a:schemeClr val="tx1"/>
+            </a:solidFill>
+          </a:ln>
+        </p:spPr>
+        <p:style>
+          <a:lnRef idx="2">
+            <a:schemeClr val="accent1">
+              <a:shade val="50000"/>
+            </a:schemeClr>
+          </a:lnRef>
+          <a:fillRef idx="1">
+            <a:schemeClr val="accent1"/>
+          </a:fillRef>
+          <a:effectRef idx="0">
+            <a:schemeClr val="accent1"/>
+          </a:effectRef>
+          <a:fontRef idx="minor">
+            <a:schemeClr val="lt1"/>
+          </a:fontRef>
+        </p:style>
+        <p:txBody>
+          <a:bodyPr rtlCol="0" anchor="ctr"/>
+          <a:lstStyle/>
+          <a:p>
+            <a:pPr algn="ctr"/>
+            <a:endParaRPr lang="en-US">
+              <a:solidFill>
+                <a:schemeClr val="tx1"/>
+              </a:solidFill>
+            </a:endParaRPr>
           </a:p>
         </p:txBody>
       </p:sp>
@@ -4851,10 +4904,4076 @@
           </a:p>
         </p:txBody>
       </p:sp>
+      <p:sp>
+        <p:nvSpPr>
+          <p:cNvPr id="44" name="Right Arrow 43"/>
+          <p:cNvSpPr/>
+          <p:nvPr/>
+        </p:nvSpPr>
+        <p:spPr>
+          <a:xfrm rot="5400000">
+            <a:off x="6529127" y="4677618"/>
+            <a:ext cx="283770" cy="249907"/>
+          </a:xfrm>
+          <a:prstGeom prst="rightArrow">
+            <a:avLst/>
+          </a:prstGeom>
+          <a:solidFill>
+            <a:srgbClr val="FFC000"/>
+          </a:solidFill>
+          <a:ln>
+            <a:solidFill>
+              <a:schemeClr val="tx1"/>
+            </a:solidFill>
+          </a:ln>
+        </p:spPr>
+        <p:style>
+          <a:lnRef idx="2">
+            <a:schemeClr val="accent1">
+              <a:shade val="50000"/>
+            </a:schemeClr>
+          </a:lnRef>
+          <a:fillRef idx="1">
+            <a:schemeClr val="accent1"/>
+          </a:fillRef>
+          <a:effectRef idx="0">
+            <a:schemeClr val="accent1"/>
+          </a:effectRef>
+          <a:fontRef idx="minor">
+            <a:schemeClr val="lt1"/>
+          </a:fontRef>
+        </p:style>
+        <p:txBody>
+          <a:bodyPr rtlCol="0" anchor="ctr"/>
+          <a:lstStyle/>
+          <a:p>
+            <a:pPr algn="ctr"/>
+            <a:endParaRPr lang="en-US"/>
+          </a:p>
+        </p:txBody>
+      </p:sp>
+      <p:sp>
+        <p:nvSpPr>
+          <p:cNvPr id="46" name="Right Arrow 45"/>
+          <p:cNvSpPr/>
+          <p:nvPr/>
+        </p:nvSpPr>
+        <p:spPr>
+          <a:xfrm rot="5400000">
+            <a:off x="6560585" y="4211307"/>
+            <a:ext cx="220056" cy="193796"/>
+          </a:xfrm>
+          <a:prstGeom prst="rightArrow">
+            <a:avLst/>
+          </a:prstGeom>
+          <a:ln>
+            <a:solidFill>
+              <a:schemeClr val="tx1"/>
+            </a:solidFill>
+          </a:ln>
+        </p:spPr>
+        <p:style>
+          <a:lnRef idx="2">
+            <a:schemeClr val="accent1">
+              <a:shade val="50000"/>
+            </a:schemeClr>
+          </a:lnRef>
+          <a:fillRef idx="1">
+            <a:schemeClr val="accent1"/>
+          </a:fillRef>
+          <a:effectRef idx="0">
+            <a:schemeClr val="accent1"/>
+          </a:effectRef>
+          <a:fontRef idx="minor">
+            <a:schemeClr val="lt1"/>
+          </a:fontRef>
+        </p:style>
+        <p:txBody>
+          <a:bodyPr rtlCol="0" anchor="ctr"/>
+          <a:lstStyle/>
+          <a:p>
+            <a:pPr algn="ctr"/>
+            <a:endParaRPr lang="en-US"/>
+          </a:p>
+        </p:txBody>
+      </p:sp>
+      <p:sp>
+        <p:nvSpPr>
+          <p:cNvPr id="47" name="Right Arrow 46"/>
+          <p:cNvSpPr/>
+          <p:nvPr/>
+        </p:nvSpPr>
+        <p:spPr>
+          <a:xfrm rot="7242132">
+            <a:off x="6712985" y="4238182"/>
+            <a:ext cx="220056" cy="193796"/>
+          </a:xfrm>
+          <a:prstGeom prst="rightArrow">
+            <a:avLst/>
+          </a:prstGeom>
+          <a:solidFill>
+            <a:srgbClr val="00B050"/>
+          </a:solidFill>
+          <a:ln>
+            <a:solidFill>
+              <a:schemeClr val="tx1"/>
+            </a:solidFill>
+          </a:ln>
+        </p:spPr>
+        <p:style>
+          <a:lnRef idx="2">
+            <a:schemeClr val="accent1">
+              <a:shade val="50000"/>
+            </a:schemeClr>
+          </a:lnRef>
+          <a:fillRef idx="1">
+            <a:schemeClr val="accent1"/>
+          </a:fillRef>
+          <a:effectRef idx="0">
+            <a:schemeClr val="accent1"/>
+          </a:effectRef>
+          <a:fontRef idx="minor">
+            <a:schemeClr val="lt1"/>
+          </a:fontRef>
+        </p:style>
+        <p:txBody>
+          <a:bodyPr rtlCol="0" anchor="ctr"/>
+          <a:lstStyle/>
+          <a:p>
+            <a:pPr algn="ctr"/>
+            <a:endParaRPr lang="en-US"/>
+          </a:p>
+        </p:txBody>
+      </p:sp>
+      <p:sp>
+        <p:nvSpPr>
+          <p:cNvPr id="49" name="Right Arrow 48"/>
+          <p:cNvSpPr/>
+          <p:nvPr/>
+        </p:nvSpPr>
+        <p:spPr>
+          <a:xfrm rot="3292932">
+            <a:off x="6391106" y="4241283"/>
+            <a:ext cx="220056" cy="193796"/>
+          </a:xfrm>
+          <a:prstGeom prst="rightArrow">
+            <a:avLst/>
+          </a:prstGeom>
+          <a:solidFill>
+            <a:srgbClr val="00B050"/>
+          </a:solidFill>
+          <a:ln>
+            <a:solidFill>
+              <a:schemeClr val="tx1"/>
+            </a:solidFill>
+          </a:ln>
+        </p:spPr>
+        <p:style>
+          <a:lnRef idx="2">
+            <a:schemeClr val="accent1">
+              <a:shade val="50000"/>
+            </a:schemeClr>
+          </a:lnRef>
+          <a:fillRef idx="1">
+            <a:schemeClr val="accent1"/>
+          </a:fillRef>
+          <a:effectRef idx="0">
+            <a:schemeClr val="accent1"/>
+          </a:effectRef>
+          <a:fontRef idx="minor">
+            <a:schemeClr val="lt1"/>
+          </a:fontRef>
+        </p:style>
+        <p:txBody>
+          <a:bodyPr rtlCol="0" anchor="ctr"/>
+          <a:lstStyle/>
+          <a:p>
+            <a:pPr algn="ctr"/>
+            <a:endParaRPr lang="en-US"/>
+          </a:p>
+        </p:txBody>
+      </p:sp>
+      <p:sp>
+        <p:nvSpPr>
+          <p:cNvPr id="45" name="Flowchart: Merge 44"/>
+          <p:cNvSpPr/>
+          <p:nvPr/>
+        </p:nvSpPr>
+        <p:spPr>
+          <a:xfrm>
+            <a:off x="6478849" y="4432086"/>
+            <a:ext cx="379028" cy="379028"/>
+          </a:xfrm>
+          <a:prstGeom prst="flowChartMerge">
+            <a:avLst/>
+          </a:prstGeom>
+          <a:solidFill>
+            <a:srgbClr val="FF0000"/>
+          </a:solidFill>
+          <a:ln>
+            <a:solidFill>
+              <a:schemeClr val="tx1"/>
+            </a:solidFill>
+          </a:ln>
+          <a:effectLst/>
+        </p:spPr>
+        <p:style>
+          <a:lnRef idx="2">
+            <a:schemeClr val="accent1">
+              <a:shade val="50000"/>
+            </a:schemeClr>
+          </a:lnRef>
+          <a:fillRef idx="1">
+            <a:schemeClr val="accent1"/>
+          </a:fillRef>
+          <a:effectRef idx="0">
+            <a:schemeClr val="accent1"/>
+          </a:effectRef>
+          <a:fontRef idx="minor">
+            <a:schemeClr val="lt1"/>
+          </a:fontRef>
+        </p:style>
+        <p:txBody>
+          <a:bodyPr rtlCol="0" anchor="ctr"/>
+          <a:lstStyle/>
+          <a:p>
+            <a:pPr algn="ctr"/>
+            <a:endParaRPr lang="en-US"/>
+          </a:p>
+        </p:txBody>
+      </p:sp>
+      <p:sp>
+        <p:nvSpPr>
+          <p:cNvPr id="2" name="Flowchart: Merge 1"/>
+          <p:cNvSpPr/>
+          <p:nvPr/>
+        </p:nvSpPr>
+        <p:spPr>
+          <a:xfrm>
+            <a:off x="4802572" y="4440629"/>
+            <a:ext cx="379028" cy="379028"/>
+          </a:xfrm>
+          <a:prstGeom prst="flowChartMerge">
+            <a:avLst/>
+          </a:prstGeom>
+          <a:solidFill>
+            <a:srgbClr val="FF0000"/>
+          </a:solidFill>
+          <a:ln>
+            <a:solidFill>
+              <a:schemeClr val="tx1"/>
+            </a:solidFill>
+          </a:ln>
+          <a:effectLst/>
+        </p:spPr>
+        <p:style>
+          <a:lnRef idx="2">
+            <a:schemeClr val="accent1">
+              <a:shade val="50000"/>
+            </a:schemeClr>
+          </a:lnRef>
+          <a:fillRef idx="1">
+            <a:schemeClr val="accent1"/>
+          </a:fillRef>
+          <a:effectRef idx="0">
+            <a:schemeClr val="accent1"/>
+          </a:effectRef>
+          <a:fontRef idx="minor">
+            <a:schemeClr val="lt1"/>
+          </a:fontRef>
+        </p:style>
+        <p:txBody>
+          <a:bodyPr rtlCol="0" anchor="ctr"/>
+          <a:lstStyle/>
+          <a:p>
+            <a:pPr algn="ctr"/>
+            <a:endParaRPr lang="en-US"/>
+          </a:p>
+        </p:txBody>
+      </p:sp>
+      <p:sp>
+        <p:nvSpPr>
+          <p:cNvPr id="50" name="Right Arrow 49"/>
+          <p:cNvSpPr/>
+          <p:nvPr/>
+        </p:nvSpPr>
+        <p:spPr>
+          <a:xfrm rot="5400000">
+            <a:off x="4884707" y="4215634"/>
+            <a:ext cx="220056" cy="193796"/>
+          </a:xfrm>
+          <a:prstGeom prst="rightArrow">
+            <a:avLst/>
+          </a:prstGeom>
+          <a:ln>
+            <a:solidFill>
+              <a:schemeClr val="tx1"/>
+            </a:solidFill>
+          </a:ln>
+        </p:spPr>
+        <p:style>
+          <a:lnRef idx="2">
+            <a:schemeClr val="accent1">
+              <a:shade val="50000"/>
+            </a:schemeClr>
+          </a:lnRef>
+          <a:fillRef idx="1">
+            <a:schemeClr val="accent1"/>
+          </a:fillRef>
+          <a:effectRef idx="0">
+            <a:schemeClr val="accent1"/>
+          </a:effectRef>
+          <a:fontRef idx="minor">
+            <a:schemeClr val="lt1"/>
+          </a:fontRef>
+        </p:style>
+        <p:txBody>
+          <a:bodyPr rtlCol="0" anchor="ctr"/>
+          <a:lstStyle/>
+          <a:p>
+            <a:pPr algn="ctr"/>
+            <a:endParaRPr lang="en-US"/>
+          </a:p>
+        </p:txBody>
+      </p:sp>
+      <p:sp>
+        <p:nvSpPr>
+          <p:cNvPr id="51" name="Flowchart: Magnetic Disk 50"/>
+          <p:cNvSpPr/>
+          <p:nvPr/>
+        </p:nvSpPr>
+        <p:spPr>
+          <a:xfrm>
+            <a:off x="1213590" y="5562600"/>
+            <a:ext cx="381123" cy="773837"/>
+          </a:xfrm>
+          <a:prstGeom prst="flowChartMagneticDisk">
+            <a:avLst/>
+          </a:prstGeom>
+          <a:ln>
+            <a:solidFill>
+              <a:schemeClr val="tx1"/>
+            </a:solidFill>
+          </a:ln>
+        </p:spPr>
+        <p:style>
+          <a:lnRef idx="2">
+            <a:schemeClr val="accent1">
+              <a:shade val="50000"/>
+            </a:schemeClr>
+          </a:lnRef>
+          <a:fillRef idx="1">
+            <a:schemeClr val="accent1"/>
+          </a:fillRef>
+          <a:effectRef idx="0">
+            <a:schemeClr val="accent1"/>
+          </a:effectRef>
+          <a:fontRef idx="minor">
+            <a:schemeClr val="lt1"/>
+          </a:fontRef>
+        </p:style>
+        <p:txBody>
+          <a:bodyPr rtlCol="0" anchor="ctr"/>
+          <a:lstStyle/>
+          <a:p>
+            <a:pPr algn="ctr"/>
+            <a:endParaRPr lang="en-US" dirty="0"/>
+          </a:p>
+        </p:txBody>
+      </p:sp>
+      <p:sp>
+        <p:nvSpPr>
+          <p:cNvPr id="3" name="Rectangle 2"/>
+          <p:cNvSpPr/>
+          <p:nvPr/>
+        </p:nvSpPr>
+        <p:spPr>
+          <a:xfrm>
+            <a:off x="1409639" y="5949518"/>
+            <a:ext cx="190561" cy="146482"/>
+          </a:xfrm>
+          <a:prstGeom prst="rect">
+            <a:avLst/>
+          </a:prstGeom>
+          <a:solidFill>
+            <a:srgbClr val="C00000"/>
+          </a:solidFill>
+          <a:ln>
+            <a:solidFill>
+              <a:schemeClr val="tx1"/>
+            </a:solidFill>
+          </a:ln>
+        </p:spPr>
+        <p:style>
+          <a:lnRef idx="2">
+            <a:schemeClr val="accent1">
+              <a:shade val="50000"/>
+            </a:schemeClr>
+          </a:lnRef>
+          <a:fillRef idx="1">
+            <a:schemeClr val="accent1"/>
+          </a:fillRef>
+          <a:effectRef idx="0">
+            <a:schemeClr val="accent1"/>
+          </a:effectRef>
+          <a:fontRef idx="minor">
+            <a:schemeClr val="lt1"/>
+          </a:fontRef>
+        </p:style>
+        <p:txBody>
+          <a:bodyPr rtlCol="0" anchor="ctr"/>
+          <a:lstStyle/>
+          <a:p>
+            <a:pPr algn="ctr"/>
+            <a:endParaRPr lang="en-US"/>
+          </a:p>
+        </p:txBody>
+      </p:sp>
+      <p:sp>
+        <p:nvSpPr>
+          <p:cNvPr id="52" name="Rectangle 51"/>
+          <p:cNvSpPr/>
+          <p:nvPr/>
+        </p:nvSpPr>
+        <p:spPr>
+          <a:xfrm>
+            <a:off x="1219200" y="5949518"/>
+            <a:ext cx="190561" cy="146482"/>
+          </a:xfrm>
+          <a:prstGeom prst="rect">
+            <a:avLst/>
+          </a:prstGeom>
+          <a:solidFill>
+            <a:srgbClr val="00B050"/>
+          </a:solidFill>
+          <a:ln>
+            <a:solidFill>
+              <a:schemeClr val="tx1"/>
+            </a:solidFill>
+          </a:ln>
+        </p:spPr>
+        <p:style>
+          <a:lnRef idx="2">
+            <a:schemeClr val="accent1">
+              <a:shade val="50000"/>
+            </a:schemeClr>
+          </a:lnRef>
+          <a:fillRef idx="1">
+            <a:schemeClr val="accent1"/>
+          </a:fillRef>
+          <a:effectRef idx="0">
+            <a:schemeClr val="accent1"/>
+          </a:effectRef>
+          <a:fontRef idx="minor">
+            <a:schemeClr val="lt1"/>
+          </a:fontRef>
+        </p:style>
+        <p:txBody>
+          <a:bodyPr rtlCol="0" anchor="ctr"/>
+          <a:lstStyle/>
+          <a:p>
+            <a:pPr algn="ctr"/>
+            <a:endParaRPr lang="en-US"/>
+          </a:p>
+        </p:txBody>
+      </p:sp>
+      <p:sp>
+        <p:nvSpPr>
+          <p:cNvPr id="53" name="Right Arrow 52"/>
+          <p:cNvSpPr/>
+          <p:nvPr/>
+        </p:nvSpPr>
+        <p:spPr>
+          <a:xfrm>
+            <a:off x="990600" y="5916966"/>
+            <a:ext cx="304800" cy="228600"/>
+          </a:xfrm>
+          <a:prstGeom prst="rightArrow">
+            <a:avLst/>
+          </a:prstGeom>
+          <a:solidFill>
+            <a:srgbClr val="FF0000"/>
+          </a:solidFill>
+          <a:ln>
+            <a:solidFill>
+              <a:schemeClr val="tx1"/>
+            </a:solidFill>
+          </a:ln>
+        </p:spPr>
+        <p:style>
+          <a:lnRef idx="2">
+            <a:schemeClr val="accent1">
+              <a:shade val="50000"/>
+            </a:schemeClr>
+          </a:lnRef>
+          <a:fillRef idx="1">
+            <a:schemeClr val="accent1"/>
+          </a:fillRef>
+          <a:effectRef idx="0">
+            <a:schemeClr val="accent1"/>
+          </a:effectRef>
+          <a:fontRef idx="minor">
+            <a:schemeClr val="lt1"/>
+          </a:fontRef>
+        </p:style>
+        <p:txBody>
+          <a:bodyPr rtlCol="0" anchor="ctr"/>
+          <a:lstStyle/>
+          <a:p>
+            <a:pPr algn="ctr"/>
+            <a:endParaRPr lang="en-US"/>
+          </a:p>
+        </p:txBody>
+      </p:sp>
+      <p:sp>
+        <p:nvSpPr>
+          <p:cNvPr id="55" name="Flowchart: Magnetic Disk 54"/>
+          <p:cNvSpPr/>
+          <p:nvPr/>
+        </p:nvSpPr>
+        <p:spPr>
+          <a:xfrm>
+            <a:off x="2585190" y="5613450"/>
+            <a:ext cx="381123" cy="773837"/>
+          </a:xfrm>
+          <a:prstGeom prst="flowChartMagneticDisk">
+            <a:avLst/>
+          </a:prstGeom>
+          <a:ln>
+            <a:solidFill>
+              <a:schemeClr val="tx1"/>
+            </a:solidFill>
+          </a:ln>
+        </p:spPr>
+        <p:style>
+          <a:lnRef idx="2">
+            <a:schemeClr val="accent1">
+              <a:shade val="50000"/>
+            </a:schemeClr>
+          </a:lnRef>
+          <a:fillRef idx="1">
+            <a:schemeClr val="accent1"/>
+          </a:fillRef>
+          <a:effectRef idx="0">
+            <a:schemeClr val="accent1"/>
+          </a:effectRef>
+          <a:fontRef idx="minor">
+            <a:schemeClr val="lt1"/>
+          </a:fontRef>
+        </p:style>
+        <p:txBody>
+          <a:bodyPr rtlCol="0" anchor="ctr"/>
+          <a:lstStyle/>
+          <a:p>
+            <a:pPr algn="ctr"/>
+            <a:endParaRPr lang="en-US" dirty="0"/>
+          </a:p>
+        </p:txBody>
+      </p:sp>
+      <p:sp>
+        <p:nvSpPr>
+          <p:cNvPr id="56" name="Rectangle 55"/>
+          <p:cNvSpPr/>
+          <p:nvPr/>
+        </p:nvSpPr>
+        <p:spPr>
+          <a:xfrm>
+            <a:off x="2781239" y="6000368"/>
+            <a:ext cx="190561" cy="146482"/>
+          </a:xfrm>
+          <a:prstGeom prst="rect">
+            <a:avLst/>
+          </a:prstGeom>
+          <a:solidFill>
+            <a:srgbClr val="C00000"/>
+          </a:solidFill>
+          <a:ln>
+            <a:solidFill>
+              <a:schemeClr val="tx1"/>
+            </a:solidFill>
+          </a:ln>
+        </p:spPr>
+        <p:style>
+          <a:lnRef idx="2">
+            <a:schemeClr val="accent1">
+              <a:shade val="50000"/>
+            </a:schemeClr>
+          </a:lnRef>
+          <a:fillRef idx="1">
+            <a:schemeClr val="accent1"/>
+          </a:fillRef>
+          <a:effectRef idx="0">
+            <a:schemeClr val="accent1"/>
+          </a:effectRef>
+          <a:fontRef idx="minor">
+            <a:schemeClr val="lt1"/>
+          </a:fontRef>
+        </p:style>
+        <p:txBody>
+          <a:bodyPr rtlCol="0" anchor="ctr"/>
+          <a:lstStyle/>
+          <a:p>
+            <a:pPr algn="ctr"/>
+            <a:endParaRPr lang="en-US"/>
+          </a:p>
+        </p:txBody>
+      </p:sp>
+      <p:sp>
+        <p:nvSpPr>
+          <p:cNvPr id="57" name="Rectangle 56"/>
+          <p:cNvSpPr/>
+          <p:nvPr/>
+        </p:nvSpPr>
+        <p:spPr>
+          <a:xfrm>
+            <a:off x="2590800" y="6000368"/>
+            <a:ext cx="190561" cy="146482"/>
+          </a:xfrm>
+          <a:prstGeom prst="rect">
+            <a:avLst/>
+          </a:prstGeom>
+          <a:solidFill>
+            <a:srgbClr val="00B050"/>
+          </a:solidFill>
+          <a:ln>
+            <a:solidFill>
+              <a:schemeClr val="tx1"/>
+            </a:solidFill>
+          </a:ln>
+        </p:spPr>
+        <p:style>
+          <a:lnRef idx="2">
+            <a:schemeClr val="accent1">
+              <a:shade val="50000"/>
+            </a:schemeClr>
+          </a:lnRef>
+          <a:fillRef idx="1">
+            <a:schemeClr val="accent1"/>
+          </a:fillRef>
+          <a:effectRef idx="0">
+            <a:schemeClr val="accent1"/>
+          </a:effectRef>
+          <a:fontRef idx="minor">
+            <a:schemeClr val="lt1"/>
+          </a:fontRef>
+        </p:style>
+        <p:txBody>
+          <a:bodyPr rtlCol="0" anchor="ctr"/>
+          <a:lstStyle/>
+          <a:p>
+            <a:pPr algn="ctr"/>
+            <a:endParaRPr lang="en-US"/>
+          </a:p>
+        </p:txBody>
+      </p:sp>
+      <p:sp>
+        <p:nvSpPr>
+          <p:cNvPr id="58" name="Right Arrow 57"/>
+          <p:cNvSpPr/>
+          <p:nvPr/>
+        </p:nvSpPr>
+        <p:spPr>
+          <a:xfrm>
+            <a:off x="2362200" y="5967816"/>
+            <a:ext cx="304800" cy="228600"/>
+          </a:xfrm>
+          <a:prstGeom prst="rightArrow">
+            <a:avLst/>
+          </a:prstGeom>
+          <a:solidFill>
+            <a:srgbClr val="FF0000"/>
+          </a:solidFill>
+          <a:ln>
+            <a:solidFill>
+              <a:schemeClr val="tx1"/>
+            </a:solidFill>
+          </a:ln>
+        </p:spPr>
+        <p:style>
+          <a:lnRef idx="2">
+            <a:schemeClr val="accent1">
+              <a:shade val="50000"/>
+            </a:schemeClr>
+          </a:lnRef>
+          <a:fillRef idx="1">
+            <a:schemeClr val="accent1"/>
+          </a:fillRef>
+          <a:effectRef idx="0">
+            <a:schemeClr val="accent1"/>
+          </a:effectRef>
+          <a:fontRef idx="minor">
+            <a:schemeClr val="lt1"/>
+          </a:fontRef>
+        </p:style>
+        <p:txBody>
+          <a:bodyPr rtlCol="0" anchor="ctr"/>
+          <a:lstStyle/>
+          <a:p>
+            <a:pPr algn="ctr"/>
+            <a:endParaRPr lang="en-US"/>
+          </a:p>
+        </p:txBody>
+      </p:sp>
+      <p:sp>
+        <p:nvSpPr>
+          <p:cNvPr id="59" name="Rectangle 58"/>
+          <p:cNvSpPr/>
+          <p:nvPr/>
+        </p:nvSpPr>
+        <p:spPr>
+          <a:xfrm>
+            <a:off x="2900426" y="5569803"/>
+            <a:ext cx="585418" cy="830997"/>
+          </a:xfrm>
+          <a:prstGeom prst="rect">
+            <a:avLst/>
+          </a:prstGeom>
+          <a:noFill/>
+          <a:ln>
+            <a:noFill/>
+          </a:ln>
+          <a:effectLst/>
+        </p:spPr>
+        <p:txBody>
+          <a:bodyPr wrap="none" lIns="91440" tIns="45720" rIns="91440" bIns="45720">
+            <a:spAutoFit/>
+          </a:bodyPr>
+          <a:lstStyle/>
+          <a:p>
+            <a:pPr algn="ctr"/>
+            <a:r>
+              <a:rPr lang="en-US" sz="4800" b="1" dirty="0" smtClean="0">
+                <a:ln w="12700">
+                  <a:solidFill>
+                    <a:schemeClr val="tx2">
+                      <a:satMod val="155000"/>
+                    </a:schemeClr>
+                  </a:solidFill>
+                  <a:prstDash val="solid"/>
+                </a:ln>
+                <a:effectLst>
+                  <a:outerShdw blurRad="41275" dist="20320" dir="1800000" algn="tl" rotWithShape="0">
+                    <a:srgbClr val="000000">
+                      <a:alpha val="40000"/>
+                    </a:srgbClr>
+                  </a:outerShdw>
+                </a:effectLst>
+              </a:rPr>
+              <a:t>[]</a:t>
+            </a:r>
+            <a:endParaRPr lang="en-US" sz="4800" b="1" cap="none" spc="0" dirty="0">
+              <a:ln w="12700">
+                <a:solidFill>
+                  <a:schemeClr val="tx2">
+                    <a:satMod val="155000"/>
+                  </a:schemeClr>
+                </a:solidFill>
+                <a:prstDash val="solid"/>
+              </a:ln>
+              <a:effectLst>
+                <a:outerShdw blurRad="41275" dist="20320" dir="1800000" algn="tl" rotWithShape="0">
+                  <a:srgbClr val="000000">
+                    <a:alpha val="40000"/>
+                  </a:srgbClr>
+                </a:outerShdw>
+              </a:effectLst>
+            </a:endParaRPr>
+          </a:p>
+        </p:txBody>
+      </p:sp>
+      <p:sp>
+        <p:nvSpPr>
+          <p:cNvPr id="17" name="Right Arrow 16"/>
+          <p:cNvSpPr/>
+          <p:nvPr/>
+        </p:nvSpPr>
+        <p:spPr>
+          <a:xfrm>
+            <a:off x="4132925" y="6163322"/>
+            <a:ext cx="963718" cy="304800"/>
+          </a:xfrm>
+          <a:prstGeom prst="rightArrow">
+            <a:avLst/>
+          </a:prstGeom>
+          <a:solidFill>
+            <a:srgbClr val="00B050"/>
+          </a:solidFill>
+          <a:ln>
+            <a:solidFill>
+              <a:schemeClr val="tx1"/>
+            </a:solidFill>
+          </a:ln>
+        </p:spPr>
+        <p:style>
+          <a:lnRef idx="2">
+            <a:schemeClr val="accent1">
+              <a:shade val="50000"/>
+            </a:schemeClr>
+          </a:lnRef>
+          <a:fillRef idx="1">
+            <a:schemeClr val="accent1"/>
+          </a:fillRef>
+          <a:effectRef idx="0">
+            <a:schemeClr val="accent1"/>
+          </a:effectRef>
+          <a:fontRef idx="minor">
+            <a:schemeClr val="lt1"/>
+          </a:fontRef>
+        </p:style>
+        <p:txBody>
+          <a:bodyPr rtlCol="0" anchor="ctr"/>
+          <a:lstStyle/>
+          <a:p>
+            <a:pPr algn="ctr"/>
+            <a:endParaRPr lang="en-US"/>
+          </a:p>
+        </p:txBody>
+      </p:sp>
+      <p:sp>
+        <p:nvSpPr>
+          <p:cNvPr id="18" name="U-Turn Arrow 17"/>
+          <p:cNvSpPr/>
+          <p:nvPr/>
+        </p:nvSpPr>
+        <p:spPr>
+          <a:xfrm>
+            <a:off x="4224277" y="5671277"/>
+            <a:ext cx="594079" cy="569920"/>
+          </a:xfrm>
+          <a:prstGeom prst="uturnArrow">
+            <a:avLst>
+              <a:gd name="adj1" fmla="val 25000"/>
+              <a:gd name="adj2" fmla="val 25000"/>
+              <a:gd name="adj3" fmla="val 25000"/>
+              <a:gd name="adj4" fmla="val 43750"/>
+              <a:gd name="adj5" fmla="val 100000"/>
+            </a:avLst>
+          </a:prstGeom>
+          <a:solidFill>
+            <a:srgbClr val="FFC000"/>
+          </a:solidFill>
+          <a:ln>
+            <a:solidFill>
+              <a:schemeClr val="tx1"/>
+            </a:solidFill>
+          </a:ln>
+        </p:spPr>
+        <p:style>
+          <a:lnRef idx="2">
+            <a:schemeClr val="accent1">
+              <a:shade val="50000"/>
+            </a:schemeClr>
+          </a:lnRef>
+          <a:fillRef idx="1">
+            <a:schemeClr val="accent1"/>
+          </a:fillRef>
+          <a:effectRef idx="0">
+            <a:schemeClr val="accent1"/>
+          </a:effectRef>
+          <a:fontRef idx="minor">
+            <a:schemeClr val="lt1"/>
+          </a:fontRef>
+        </p:style>
+        <p:txBody>
+          <a:bodyPr rtlCol="0" anchor="ctr"/>
+          <a:lstStyle/>
+          <a:p>
+            <a:pPr algn="ctr"/>
+            <a:endParaRPr lang="en-US">
+              <a:solidFill>
+                <a:schemeClr val="tx1"/>
+              </a:solidFill>
+            </a:endParaRPr>
+          </a:p>
+        </p:txBody>
+      </p:sp>
+      <p:sp>
+        <p:nvSpPr>
+          <p:cNvPr id="60" name="Flowchart: Magnetic Disk 59"/>
+          <p:cNvSpPr/>
+          <p:nvPr/>
+        </p:nvSpPr>
+        <p:spPr>
+          <a:xfrm>
+            <a:off x="5715000" y="5598382"/>
+            <a:ext cx="381123" cy="773837"/>
+          </a:xfrm>
+          <a:prstGeom prst="flowChartMagneticDisk">
+            <a:avLst/>
+          </a:prstGeom>
+          <a:ln>
+            <a:solidFill>
+              <a:schemeClr val="tx1"/>
+            </a:solidFill>
+          </a:ln>
+        </p:spPr>
+        <p:style>
+          <a:lnRef idx="2">
+            <a:schemeClr val="accent1">
+              <a:shade val="50000"/>
+            </a:schemeClr>
+          </a:lnRef>
+          <a:fillRef idx="1">
+            <a:schemeClr val="accent1"/>
+          </a:fillRef>
+          <a:effectRef idx="0">
+            <a:schemeClr val="accent1"/>
+          </a:effectRef>
+          <a:fontRef idx="minor">
+            <a:schemeClr val="lt1"/>
+          </a:fontRef>
+        </p:style>
+        <p:txBody>
+          <a:bodyPr rtlCol="0" anchor="ctr"/>
+          <a:lstStyle/>
+          <a:p>
+            <a:pPr algn="ctr"/>
+            <a:endParaRPr lang="en-US" dirty="0"/>
+          </a:p>
+        </p:txBody>
+      </p:sp>
+      <p:sp>
+        <p:nvSpPr>
+          <p:cNvPr id="61" name="Rectangle 60"/>
+          <p:cNvSpPr/>
+          <p:nvPr/>
+        </p:nvSpPr>
+        <p:spPr>
+          <a:xfrm>
+            <a:off x="5911049" y="5985300"/>
+            <a:ext cx="190561" cy="146482"/>
+          </a:xfrm>
+          <a:prstGeom prst="rect">
+            <a:avLst/>
+          </a:prstGeom>
+          <a:solidFill>
+            <a:srgbClr val="C00000"/>
+          </a:solidFill>
+          <a:ln>
+            <a:solidFill>
+              <a:schemeClr val="tx1"/>
+            </a:solidFill>
+          </a:ln>
+        </p:spPr>
+        <p:style>
+          <a:lnRef idx="2">
+            <a:schemeClr val="accent1">
+              <a:shade val="50000"/>
+            </a:schemeClr>
+          </a:lnRef>
+          <a:fillRef idx="1">
+            <a:schemeClr val="accent1"/>
+          </a:fillRef>
+          <a:effectRef idx="0">
+            <a:schemeClr val="accent1"/>
+          </a:effectRef>
+          <a:fontRef idx="minor">
+            <a:schemeClr val="lt1"/>
+          </a:fontRef>
+        </p:style>
+        <p:txBody>
+          <a:bodyPr rtlCol="0" anchor="ctr"/>
+          <a:lstStyle/>
+          <a:p>
+            <a:pPr algn="ctr"/>
+            <a:endParaRPr lang="en-US"/>
+          </a:p>
+        </p:txBody>
+      </p:sp>
+      <p:sp>
+        <p:nvSpPr>
+          <p:cNvPr id="62" name="Rectangle 61"/>
+          <p:cNvSpPr/>
+          <p:nvPr/>
+        </p:nvSpPr>
+        <p:spPr>
+          <a:xfrm>
+            <a:off x="5720610" y="5985300"/>
+            <a:ext cx="190561" cy="146482"/>
+          </a:xfrm>
+          <a:prstGeom prst="rect">
+            <a:avLst/>
+          </a:prstGeom>
+          <a:solidFill>
+            <a:srgbClr val="00B050"/>
+          </a:solidFill>
+          <a:ln>
+            <a:solidFill>
+              <a:schemeClr val="tx1"/>
+            </a:solidFill>
+          </a:ln>
+        </p:spPr>
+        <p:style>
+          <a:lnRef idx="2">
+            <a:schemeClr val="accent1">
+              <a:shade val="50000"/>
+            </a:schemeClr>
+          </a:lnRef>
+          <a:fillRef idx="1">
+            <a:schemeClr val="accent1"/>
+          </a:fillRef>
+          <a:effectRef idx="0">
+            <a:schemeClr val="accent1"/>
+          </a:effectRef>
+          <a:fontRef idx="minor">
+            <a:schemeClr val="lt1"/>
+          </a:fontRef>
+        </p:style>
+        <p:txBody>
+          <a:bodyPr rtlCol="0" anchor="ctr"/>
+          <a:lstStyle/>
+          <a:p>
+            <a:pPr algn="ctr"/>
+            <a:endParaRPr lang="en-US"/>
+          </a:p>
+        </p:txBody>
+      </p:sp>
+      <p:sp>
+        <p:nvSpPr>
+          <p:cNvPr id="19" name="U-Turn Arrow 18"/>
+          <p:cNvSpPr/>
+          <p:nvPr/>
+        </p:nvSpPr>
+        <p:spPr>
+          <a:xfrm rot="5400000">
+            <a:off x="6093816" y="5977728"/>
+            <a:ext cx="284162" cy="257181"/>
+          </a:xfrm>
+          <a:prstGeom prst="uturnArrow">
+            <a:avLst>
+              <a:gd name="adj1" fmla="val 25000"/>
+              <a:gd name="adj2" fmla="val 25000"/>
+              <a:gd name="adj3" fmla="val 25000"/>
+              <a:gd name="adj4" fmla="val 43750"/>
+              <a:gd name="adj5" fmla="val 100000"/>
+            </a:avLst>
+          </a:prstGeom>
+          <a:solidFill>
+            <a:srgbClr val="FFC000"/>
+          </a:solidFill>
+        </p:spPr>
+        <p:style>
+          <a:lnRef idx="2">
+            <a:schemeClr val="accent1">
+              <a:shade val="50000"/>
+            </a:schemeClr>
+          </a:lnRef>
+          <a:fillRef idx="1">
+            <a:schemeClr val="accent1"/>
+          </a:fillRef>
+          <a:effectRef idx="0">
+            <a:schemeClr val="accent1"/>
+          </a:effectRef>
+          <a:fontRef idx="minor">
+            <a:schemeClr val="lt1"/>
+          </a:fontRef>
+        </p:style>
+        <p:txBody>
+          <a:bodyPr rtlCol="0" anchor="ctr"/>
+          <a:lstStyle/>
+          <a:p>
+            <a:pPr algn="ctr"/>
+            <a:endParaRPr lang="en-US">
+              <a:solidFill>
+                <a:schemeClr val="tx1"/>
+              </a:solidFill>
+            </a:endParaRPr>
+          </a:p>
+        </p:txBody>
+      </p:sp>
+      <p:sp>
+        <p:nvSpPr>
+          <p:cNvPr id="64" name="U-Turn Arrow 63"/>
+          <p:cNvSpPr/>
+          <p:nvPr/>
+        </p:nvSpPr>
+        <p:spPr>
+          <a:xfrm>
+            <a:off x="7238877" y="5764151"/>
+            <a:ext cx="594079" cy="569920"/>
+          </a:xfrm>
+          <a:prstGeom prst="uturnArrow">
+            <a:avLst>
+              <a:gd name="adj1" fmla="val 25000"/>
+              <a:gd name="adj2" fmla="val 25000"/>
+              <a:gd name="adj3" fmla="val 25000"/>
+              <a:gd name="adj4" fmla="val 43750"/>
+              <a:gd name="adj5" fmla="val 100000"/>
+            </a:avLst>
+          </a:prstGeom>
+          <a:solidFill>
+            <a:srgbClr val="FFC000"/>
+          </a:solidFill>
+          <a:ln>
+            <a:solidFill>
+              <a:schemeClr val="tx1"/>
+            </a:solidFill>
+          </a:ln>
+        </p:spPr>
+        <p:style>
+          <a:lnRef idx="2">
+            <a:schemeClr val="accent1">
+              <a:shade val="50000"/>
+            </a:schemeClr>
+          </a:lnRef>
+          <a:fillRef idx="1">
+            <a:schemeClr val="accent1"/>
+          </a:fillRef>
+          <a:effectRef idx="0">
+            <a:schemeClr val="accent1"/>
+          </a:effectRef>
+          <a:fontRef idx="minor">
+            <a:schemeClr val="lt1"/>
+          </a:fontRef>
+        </p:style>
+        <p:txBody>
+          <a:bodyPr rtlCol="0" anchor="ctr"/>
+          <a:lstStyle/>
+          <a:p>
+            <a:pPr algn="ctr"/>
+            <a:endParaRPr lang="en-US">
+              <a:solidFill>
+                <a:schemeClr val="tx1"/>
+              </a:solidFill>
+            </a:endParaRPr>
+          </a:p>
+        </p:txBody>
+      </p:sp>
+      <p:sp>
+        <p:nvSpPr>
+          <p:cNvPr id="65" name="Rectangle 64"/>
+          <p:cNvSpPr/>
+          <p:nvPr/>
+        </p:nvSpPr>
+        <p:spPr>
+          <a:xfrm>
+            <a:off x="7229271" y="6193950"/>
+            <a:ext cx="190561" cy="146482"/>
+          </a:xfrm>
+          <a:prstGeom prst="rect">
+            <a:avLst/>
+          </a:prstGeom>
+          <a:solidFill>
+            <a:srgbClr val="C00000"/>
+          </a:solidFill>
+          <a:ln>
+            <a:solidFill>
+              <a:schemeClr val="tx1"/>
+            </a:solidFill>
+          </a:ln>
+        </p:spPr>
+        <p:style>
+          <a:lnRef idx="2">
+            <a:schemeClr val="accent1">
+              <a:shade val="50000"/>
+            </a:schemeClr>
+          </a:lnRef>
+          <a:fillRef idx="1">
+            <a:schemeClr val="accent1"/>
+          </a:fillRef>
+          <a:effectRef idx="0">
+            <a:schemeClr val="accent1"/>
+          </a:effectRef>
+          <a:fontRef idx="minor">
+            <a:schemeClr val="lt1"/>
+          </a:fontRef>
+        </p:style>
+        <p:txBody>
+          <a:bodyPr rtlCol="0" anchor="ctr"/>
+          <a:lstStyle/>
+          <a:p>
+            <a:pPr algn="ctr"/>
+            <a:endParaRPr lang="en-US"/>
+          </a:p>
+        </p:txBody>
+      </p:sp>
+      <p:sp>
+        <p:nvSpPr>
+          <p:cNvPr id="66" name="Rectangle 65"/>
+          <p:cNvSpPr/>
+          <p:nvPr/>
+        </p:nvSpPr>
+        <p:spPr>
+          <a:xfrm>
+            <a:off x="7230875" y="6034390"/>
+            <a:ext cx="190561" cy="146482"/>
+          </a:xfrm>
+          <a:prstGeom prst="rect">
+            <a:avLst/>
+          </a:prstGeom>
+          <a:solidFill>
+            <a:srgbClr val="00B050"/>
+          </a:solidFill>
+          <a:ln>
+            <a:solidFill>
+              <a:schemeClr val="tx1"/>
+            </a:solidFill>
+          </a:ln>
+        </p:spPr>
+        <p:style>
+          <a:lnRef idx="2">
+            <a:schemeClr val="accent1">
+              <a:shade val="50000"/>
+            </a:schemeClr>
+          </a:lnRef>
+          <a:fillRef idx="1">
+            <a:schemeClr val="accent1"/>
+          </a:fillRef>
+          <a:effectRef idx="0">
+            <a:schemeClr val="accent1"/>
+          </a:effectRef>
+          <a:fontRef idx="minor">
+            <a:schemeClr val="lt1"/>
+          </a:fontRef>
+        </p:style>
+        <p:txBody>
+          <a:bodyPr rtlCol="0" anchor="ctr"/>
+          <a:lstStyle/>
+          <a:p>
+            <a:pPr algn="ctr"/>
+            <a:endParaRPr lang="en-US"/>
+          </a:p>
+        </p:txBody>
+      </p:sp>
+      <p:sp>
+        <p:nvSpPr>
+          <p:cNvPr id="67" name="Right Arrow 66"/>
+          <p:cNvSpPr/>
+          <p:nvPr/>
+        </p:nvSpPr>
+        <p:spPr>
+          <a:xfrm>
+            <a:off x="6969137" y="6152891"/>
+            <a:ext cx="304800" cy="228600"/>
+          </a:xfrm>
+          <a:prstGeom prst="rightArrow">
+            <a:avLst/>
+          </a:prstGeom>
+          <a:solidFill>
+            <a:srgbClr val="FF0000"/>
+          </a:solidFill>
+          <a:ln>
+            <a:solidFill>
+              <a:schemeClr val="tx1"/>
+            </a:solidFill>
+          </a:ln>
+        </p:spPr>
+        <p:style>
+          <a:lnRef idx="2">
+            <a:schemeClr val="accent1">
+              <a:shade val="50000"/>
+            </a:schemeClr>
+          </a:lnRef>
+          <a:fillRef idx="1">
+            <a:schemeClr val="accent1"/>
+          </a:fillRef>
+          <a:effectRef idx="0">
+            <a:schemeClr val="accent1"/>
+          </a:effectRef>
+          <a:fontRef idx="minor">
+            <a:schemeClr val="lt1"/>
+          </a:fontRef>
+        </p:style>
+        <p:txBody>
+          <a:bodyPr rtlCol="0" anchor="ctr"/>
+          <a:lstStyle/>
+          <a:p>
+            <a:pPr algn="ctr"/>
+            <a:endParaRPr lang="en-US"/>
+          </a:p>
+        </p:txBody>
+      </p:sp>
+      <p:sp>
+        <p:nvSpPr>
+          <p:cNvPr id="68" name="Right Arrow 67"/>
+          <p:cNvSpPr/>
+          <p:nvPr/>
+        </p:nvSpPr>
+        <p:spPr>
+          <a:xfrm>
+            <a:off x="7620000" y="4932674"/>
+            <a:ext cx="762000" cy="304800"/>
+          </a:xfrm>
+          <a:prstGeom prst="rightArrow">
+            <a:avLst/>
+          </a:prstGeom>
+          <a:solidFill>
+            <a:srgbClr val="00B050"/>
+          </a:solidFill>
+          <a:ln>
+            <a:solidFill>
+              <a:schemeClr val="tx1"/>
+            </a:solidFill>
+          </a:ln>
+        </p:spPr>
+        <p:style>
+          <a:lnRef idx="2">
+            <a:schemeClr val="accent1">
+              <a:shade val="50000"/>
+            </a:schemeClr>
+          </a:lnRef>
+          <a:fillRef idx="1">
+            <a:schemeClr val="accent1"/>
+          </a:fillRef>
+          <a:effectRef idx="0">
+            <a:schemeClr val="accent1"/>
+          </a:effectRef>
+          <a:fontRef idx="minor">
+            <a:schemeClr val="lt1"/>
+          </a:fontRef>
+        </p:style>
+        <p:txBody>
+          <a:bodyPr rtlCol="0" anchor="ctr"/>
+          <a:lstStyle/>
+          <a:p>
+            <a:pPr algn="ctr"/>
+            <a:endParaRPr lang="en-US"/>
+          </a:p>
+        </p:txBody>
+      </p:sp>
+      <p:sp>
+        <p:nvSpPr>
+          <p:cNvPr id="69" name="U-Turn Arrow 68"/>
+          <p:cNvSpPr/>
+          <p:nvPr/>
+        </p:nvSpPr>
+        <p:spPr>
+          <a:xfrm>
+            <a:off x="7780160" y="4725589"/>
+            <a:ext cx="297040" cy="284960"/>
+          </a:xfrm>
+          <a:prstGeom prst="uturnArrow">
+            <a:avLst>
+              <a:gd name="adj1" fmla="val 25000"/>
+              <a:gd name="adj2" fmla="val 25000"/>
+              <a:gd name="adj3" fmla="val 25000"/>
+              <a:gd name="adj4" fmla="val 43750"/>
+              <a:gd name="adj5" fmla="val 100000"/>
+            </a:avLst>
+          </a:prstGeom>
+          <a:solidFill>
+            <a:srgbClr val="00B050"/>
+          </a:solidFill>
+          <a:ln>
+            <a:solidFill>
+              <a:schemeClr val="tx1"/>
+            </a:solidFill>
+          </a:ln>
+        </p:spPr>
+        <p:style>
+          <a:lnRef idx="2">
+            <a:schemeClr val="accent1">
+              <a:shade val="50000"/>
+            </a:schemeClr>
+          </a:lnRef>
+          <a:fillRef idx="1">
+            <a:schemeClr val="accent1"/>
+          </a:fillRef>
+          <a:effectRef idx="0">
+            <a:schemeClr val="accent1"/>
+          </a:effectRef>
+          <a:fontRef idx="minor">
+            <a:schemeClr val="lt1"/>
+          </a:fontRef>
+        </p:style>
+        <p:txBody>
+          <a:bodyPr rtlCol="0" anchor="ctr"/>
+          <a:lstStyle/>
+          <a:p>
+            <a:pPr algn="ctr"/>
+            <a:endParaRPr lang="en-US">
+              <a:solidFill>
+                <a:schemeClr val="tx1"/>
+              </a:solidFill>
+            </a:endParaRPr>
+          </a:p>
+        </p:txBody>
+      </p:sp>
     </p:spTree>
     <p:extLst>
       <p:ext uri="{BB962C8B-B14F-4D97-AF65-F5344CB8AC3E}">
         <p14:creationId xmlns:p14="http://schemas.microsoft.com/office/powerpoint/2010/main" val="2700207087"/>
+      </p:ext>
+    </p:extLst>
+  </p:cSld>
+  <p:clrMapOvr>
+    <a:masterClrMapping/>
+  </p:clrMapOvr>
+</p:sld>
+</file>
+
+<file path=ppt/slides/slide2.xml><?xml version="1.0" encoding="utf-8"?>
+<p:sld xmlns:a="http://schemas.openxmlformats.org/drawingml/2006/main" xmlns:r="http://schemas.openxmlformats.org/officeDocument/2006/relationships" xmlns:p="http://schemas.openxmlformats.org/presentationml/2006/main">
+  <p:cSld>
+    <p:spTree>
+      <p:nvGrpSpPr>
+        <p:cNvPr id="1" name=""/>
+        <p:cNvGrpSpPr/>
+        <p:nvPr/>
+      </p:nvGrpSpPr>
+      <p:grpSpPr>
+        <a:xfrm>
+          <a:off x="0" y="0"/>
+          <a:ext cx="0" cy="0"/>
+          <a:chOff x="0" y="0"/>
+          <a:chExt cx="0" cy="0"/>
+        </a:xfrm>
+      </p:grpSpPr>
+      <p:sp>
+        <p:nvSpPr>
+          <p:cNvPr id="16" name="Rectangle 15"/>
+          <p:cNvSpPr/>
+          <p:nvPr/>
+        </p:nvSpPr>
+        <p:spPr>
+          <a:xfrm>
+            <a:off x="1906649" y="1320225"/>
+            <a:ext cx="522900" cy="584775"/>
+          </a:xfrm>
+          <a:prstGeom prst="rect">
+            <a:avLst/>
+          </a:prstGeom>
+          <a:solidFill>
+            <a:schemeClr val="accent3"/>
+          </a:solidFill>
+          <a:ln>
+            <a:solidFill>
+              <a:schemeClr val="tx1"/>
+            </a:solidFill>
+          </a:ln>
+          <a:effectLst/>
+        </p:spPr>
+        <p:txBody>
+          <a:bodyPr wrap="none" lIns="91440" tIns="45720" rIns="91440" bIns="45720">
+            <a:spAutoFit/>
+          </a:bodyPr>
+          <a:lstStyle/>
+          <a:p>
+            <a:pPr algn="ctr"/>
+            <a:r>
+              <a:rPr lang="en-US" sz="3200" b="1" cap="none" spc="0" dirty="0" smtClean="0">
+                <a:ln w="12700">
+                  <a:solidFill>
+                    <a:schemeClr val="tx2">
+                      <a:satMod val="155000"/>
+                    </a:schemeClr>
+                  </a:solidFill>
+                  <a:prstDash val="solid"/>
+                </a:ln>
+                <a:solidFill>
+                  <a:srgbClr val="FFFF00"/>
+                </a:solidFill>
+                <a:effectLst>
+                  <a:outerShdw blurRad="41275" dist="20320" dir="1800000" algn="tl" rotWithShape="0">
+                    <a:srgbClr val="000000">
+                      <a:alpha val="40000"/>
+                    </a:srgbClr>
+                  </a:outerShdw>
+                </a:effectLst>
+              </a:rPr>
+              <a:t>!=</a:t>
+            </a:r>
+            <a:endParaRPr lang="en-US" sz="3200" b="1" cap="none" spc="0" dirty="0">
+              <a:ln w="12700">
+                <a:solidFill>
+                  <a:schemeClr val="tx2">
+                    <a:satMod val="155000"/>
+                  </a:schemeClr>
+                </a:solidFill>
+                <a:prstDash val="solid"/>
+              </a:ln>
+              <a:solidFill>
+                <a:srgbClr val="FFFF00"/>
+              </a:solidFill>
+              <a:effectLst>
+                <a:outerShdw blurRad="41275" dist="20320" dir="1800000" algn="tl" rotWithShape="0">
+                  <a:srgbClr val="000000">
+                    <a:alpha val="40000"/>
+                  </a:srgbClr>
+                </a:outerShdw>
+              </a:effectLst>
+            </a:endParaRPr>
+          </a:p>
+        </p:txBody>
+      </p:sp>
+      <p:sp>
+        <p:nvSpPr>
+          <p:cNvPr id="17" name="Rectangle 16"/>
+          <p:cNvSpPr/>
+          <p:nvPr/>
+        </p:nvSpPr>
+        <p:spPr>
+          <a:xfrm>
+            <a:off x="847132" y="1320224"/>
+            <a:ext cx="595036" cy="584775"/>
+          </a:xfrm>
+          <a:prstGeom prst="rect">
+            <a:avLst/>
+          </a:prstGeom>
+          <a:solidFill>
+            <a:schemeClr val="accent3"/>
+          </a:solidFill>
+          <a:ln>
+            <a:solidFill>
+              <a:schemeClr val="tx1"/>
+            </a:solidFill>
+          </a:ln>
+          <a:effectLst/>
+        </p:spPr>
+        <p:txBody>
+          <a:bodyPr wrap="none" lIns="91440" tIns="45720" rIns="91440" bIns="45720">
+            <a:spAutoFit/>
+          </a:bodyPr>
+          <a:lstStyle/>
+          <a:p>
+            <a:pPr algn="ctr"/>
+            <a:r>
+              <a:rPr lang="en-US" sz="3200" b="1" dirty="0">
+                <a:ln w="12700">
+                  <a:solidFill>
+                    <a:schemeClr val="tx2">
+                      <a:satMod val="155000"/>
+                    </a:schemeClr>
+                  </a:solidFill>
+                  <a:prstDash val="solid"/>
+                </a:ln>
+                <a:solidFill>
+                  <a:srgbClr val="FFFF00"/>
+                </a:solidFill>
+                <a:effectLst>
+                  <a:outerShdw blurRad="41275" dist="20320" dir="1800000" algn="tl" rotWithShape="0">
+                    <a:srgbClr val="000000">
+                      <a:alpha val="40000"/>
+                    </a:srgbClr>
+                  </a:outerShdw>
+                </a:effectLst>
+              </a:rPr>
+              <a:t>=</a:t>
+            </a:r>
+            <a:r>
+              <a:rPr lang="en-US" sz="3200" b="1" cap="none" spc="0" dirty="0" smtClean="0">
+                <a:ln w="12700">
+                  <a:solidFill>
+                    <a:schemeClr val="tx2">
+                      <a:satMod val="155000"/>
+                    </a:schemeClr>
+                  </a:solidFill>
+                  <a:prstDash val="solid"/>
+                </a:ln>
+                <a:solidFill>
+                  <a:srgbClr val="FFFF00"/>
+                </a:solidFill>
+                <a:effectLst>
+                  <a:outerShdw blurRad="41275" dist="20320" dir="1800000" algn="tl" rotWithShape="0">
+                    <a:srgbClr val="000000">
+                      <a:alpha val="40000"/>
+                    </a:srgbClr>
+                  </a:outerShdw>
+                </a:effectLst>
+              </a:rPr>
+              <a:t>=</a:t>
+            </a:r>
+            <a:endParaRPr lang="en-US" sz="3200" b="1" cap="none" spc="0" dirty="0">
+              <a:ln w="12700">
+                <a:solidFill>
+                  <a:schemeClr val="tx2">
+                    <a:satMod val="155000"/>
+                  </a:schemeClr>
+                </a:solidFill>
+                <a:prstDash val="solid"/>
+              </a:ln>
+              <a:solidFill>
+                <a:srgbClr val="FFFF00"/>
+              </a:solidFill>
+              <a:effectLst>
+                <a:outerShdw blurRad="41275" dist="20320" dir="1800000" algn="tl" rotWithShape="0">
+                  <a:srgbClr val="000000">
+                    <a:alpha val="40000"/>
+                  </a:srgbClr>
+                </a:outerShdw>
+              </a:effectLst>
+            </a:endParaRPr>
+          </a:p>
+        </p:txBody>
+      </p:sp>
+      <p:sp>
+        <p:nvSpPr>
+          <p:cNvPr id="18" name="Rectangle 17"/>
+          <p:cNvSpPr/>
+          <p:nvPr/>
+        </p:nvSpPr>
+        <p:spPr>
+          <a:xfrm>
+            <a:off x="2877074" y="1320223"/>
+            <a:ext cx="389850" cy="584775"/>
+          </a:xfrm>
+          <a:prstGeom prst="rect">
+            <a:avLst/>
+          </a:prstGeom>
+          <a:solidFill>
+            <a:schemeClr val="accent3"/>
+          </a:solidFill>
+          <a:ln>
+            <a:solidFill>
+              <a:schemeClr val="tx1"/>
+            </a:solidFill>
+          </a:ln>
+          <a:effectLst/>
+        </p:spPr>
+        <p:txBody>
+          <a:bodyPr wrap="none" lIns="91440" tIns="45720" rIns="91440" bIns="45720">
+            <a:spAutoFit/>
+          </a:bodyPr>
+          <a:lstStyle/>
+          <a:p>
+            <a:pPr algn="ctr"/>
+            <a:r>
+              <a:rPr lang="en-US" sz="3200" b="1" cap="none" spc="0" dirty="0" smtClean="0">
+                <a:ln w="12700">
+                  <a:solidFill>
+                    <a:schemeClr val="tx2">
+                      <a:satMod val="155000"/>
+                    </a:schemeClr>
+                  </a:solidFill>
+                  <a:prstDash val="solid"/>
+                </a:ln>
+                <a:solidFill>
+                  <a:srgbClr val="FFFF00"/>
+                </a:solidFill>
+                <a:effectLst>
+                  <a:outerShdw blurRad="41275" dist="20320" dir="1800000" algn="tl" rotWithShape="0">
+                    <a:srgbClr val="000000">
+                      <a:alpha val="40000"/>
+                    </a:srgbClr>
+                  </a:outerShdw>
+                </a:effectLst>
+              </a:rPr>
+              <a:t>&lt;</a:t>
+            </a:r>
+            <a:endParaRPr lang="en-US" sz="3200" b="1" cap="none" spc="0" dirty="0">
+              <a:ln w="12700">
+                <a:solidFill>
+                  <a:schemeClr val="tx2">
+                    <a:satMod val="155000"/>
+                  </a:schemeClr>
+                </a:solidFill>
+                <a:prstDash val="solid"/>
+              </a:ln>
+              <a:solidFill>
+                <a:srgbClr val="FFFF00"/>
+              </a:solidFill>
+              <a:effectLst>
+                <a:outerShdw blurRad="41275" dist="20320" dir="1800000" algn="tl" rotWithShape="0">
+                  <a:srgbClr val="000000">
+                    <a:alpha val="40000"/>
+                  </a:srgbClr>
+                </a:outerShdw>
+              </a:effectLst>
+            </a:endParaRPr>
+          </a:p>
+        </p:txBody>
+      </p:sp>
+      <p:sp>
+        <p:nvSpPr>
+          <p:cNvPr id="19" name="Rectangle 18"/>
+          <p:cNvSpPr/>
+          <p:nvPr/>
+        </p:nvSpPr>
+        <p:spPr>
+          <a:xfrm>
+            <a:off x="3663313" y="1320222"/>
+            <a:ext cx="595036" cy="584775"/>
+          </a:xfrm>
+          <a:prstGeom prst="rect">
+            <a:avLst/>
+          </a:prstGeom>
+          <a:solidFill>
+            <a:schemeClr val="accent3"/>
+          </a:solidFill>
+          <a:ln>
+            <a:solidFill>
+              <a:schemeClr val="tx1"/>
+            </a:solidFill>
+          </a:ln>
+          <a:effectLst/>
+        </p:spPr>
+        <p:txBody>
+          <a:bodyPr wrap="none" lIns="91440" tIns="45720" rIns="91440" bIns="45720">
+            <a:spAutoFit/>
+          </a:bodyPr>
+          <a:lstStyle/>
+          <a:p>
+            <a:pPr algn="ctr"/>
+            <a:r>
+              <a:rPr lang="en-US" sz="3200" b="1" cap="none" spc="0" dirty="0" smtClean="0">
+                <a:ln w="12700">
+                  <a:solidFill>
+                    <a:schemeClr val="tx2">
+                      <a:satMod val="155000"/>
+                    </a:schemeClr>
+                  </a:solidFill>
+                  <a:prstDash val="solid"/>
+                </a:ln>
+                <a:solidFill>
+                  <a:srgbClr val="FFFF00"/>
+                </a:solidFill>
+                <a:effectLst>
+                  <a:outerShdw blurRad="41275" dist="20320" dir="1800000" algn="tl" rotWithShape="0">
+                    <a:srgbClr val="000000">
+                      <a:alpha val="40000"/>
+                    </a:srgbClr>
+                  </a:outerShdw>
+                </a:effectLst>
+              </a:rPr>
+              <a:t>&lt;=</a:t>
+            </a:r>
+            <a:endParaRPr lang="en-US" sz="3200" b="1" cap="none" spc="0" dirty="0">
+              <a:ln w="12700">
+                <a:solidFill>
+                  <a:schemeClr val="tx2">
+                    <a:satMod val="155000"/>
+                  </a:schemeClr>
+                </a:solidFill>
+                <a:prstDash val="solid"/>
+              </a:ln>
+              <a:solidFill>
+                <a:srgbClr val="FFFF00"/>
+              </a:solidFill>
+              <a:effectLst>
+                <a:outerShdw blurRad="41275" dist="20320" dir="1800000" algn="tl" rotWithShape="0">
+                  <a:srgbClr val="000000">
+                    <a:alpha val="40000"/>
+                  </a:srgbClr>
+                </a:outerShdw>
+              </a:effectLst>
+            </a:endParaRPr>
+          </a:p>
+        </p:txBody>
+      </p:sp>
+      <p:sp>
+        <p:nvSpPr>
+          <p:cNvPr id="20" name="Rectangle 19"/>
+          <p:cNvSpPr/>
+          <p:nvPr/>
+        </p:nvSpPr>
+        <p:spPr>
+          <a:xfrm>
+            <a:off x="4653913" y="1320225"/>
+            <a:ext cx="595036" cy="584775"/>
+          </a:xfrm>
+          <a:prstGeom prst="rect">
+            <a:avLst/>
+          </a:prstGeom>
+          <a:solidFill>
+            <a:schemeClr val="accent3"/>
+          </a:solidFill>
+          <a:ln>
+            <a:solidFill>
+              <a:schemeClr val="tx1"/>
+            </a:solidFill>
+          </a:ln>
+          <a:effectLst/>
+        </p:spPr>
+        <p:txBody>
+          <a:bodyPr wrap="none" lIns="91440" tIns="45720" rIns="91440" bIns="45720">
+            <a:spAutoFit/>
+          </a:bodyPr>
+          <a:lstStyle/>
+          <a:p>
+            <a:pPr algn="ctr"/>
+            <a:r>
+              <a:rPr lang="en-US" sz="3200" b="1" cap="none" spc="0" dirty="0" smtClean="0">
+                <a:ln w="12700">
+                  <a:solidFill>
+                    <a:schemeClr val="tx2">
+                      <a:satMod val="155000"/>
+                    </a:schemeClr>
+                  </a:solidFill>
+                  <a:prstDash val="solid"/>
+                </a:ln>
+                <a:solidFill>
+                  <a:srgbClr val="FFFF00"/>
+                </a:solidFill>
+                <a:effectLst>
+                  <a:outerShdw blurRad="41275" dist="20320" dir="1800000" algn="tl" rotWithShape="0">
+                    <a:srgbClr val="000000">
+                      <a:alpha val="40000"/>
+                    </a:srgbClr>
+                  </a:outerShdw>
+                </a:effectLst>
+              </a:rPr>
+              <a:t>&gt;=</a:t>
+            </a:r>
+            <a:endParaRPr lang="en-US" sz="3200" b="1" cap="none" spc="0" dirty="0">
+              <a:ln w="12700">
+                <a:solidFill>
+                  <a:schemeClr val="tx2">
+                    <a:satMod val="155000"/>
+                  </a:schemeClr>
+                </a:solidFill>
+                <a:prstDash val="solid"/>
+              </a:ln>
+              <a:solidFill>
+                <a:srgbClr val="FFFF00"/>
+              </a:solidFill>
+              <a:effectLst>
+                <a:outerShdw blurRad="41275" dist="20320" dir="1800000" algn="tl" rotWithShape="0">
+                  <a:srgbClr val="000000">
+                    <a:alpha val="40000"/>
+                  </a:srgbClr>
+                </a:outerShdw>
+              </a:effectLst>
+            </a:endParaRPr>
+          </a:p>
+        </p:txBody>
+      </p:sp>
+      <p:sp>
+        <p:nvSpPr>
+          <p:cNvPr id="21" name="Rectangle 20"/>
+          <p:cNvSpPr/>
+          <p:nvPr/>
+        </p:nvSpPr>
+        <p:spPr>
+          <a:xfrm>
+            <a:off x="5629949" y="1320221"/>
+            <a:ext cx="389851" cy="584775"/>
+          </a:xfrm>
+          <a:prstGeom prst="rect">
+            <a:avLst/>
+          </a:prstGeom>
+          <a:solidFill>
+            <a:schemeClr val="accent3"/>
+          </a:solidFill>
+          <a:ln>
+            <a:solidFill>
+              <a:schemeClr val="tx1"/>
+            </a:solidFill>
+          </a:ln>
+          <a:effectLst/>
+        </p:spPr>
+        <p:txBody>
+          <a:bodyPr wrap="none" lIns="91440" tIns="45720" rIns="91440" bIns="45720">
+            <a:spAutoFit/>
+          </a:bodyPr>
+          <a:lstStyle/>
+          <a:p>
+            <a:pPr algn="ctr"/>
+            <a:r>
+              <a:rPr lang="en-US" sz="3200" b="1" dirty="0">
+                <a:ln w="12700">
+                  <a:solidFill>
+                    <a:schemeClr val="tx2">
+                      <a:satMod val="155000"/>
+                    </a:schemeClr>
+                  </a:solidFill>
+                  <a:prstDash val="solid"/>
+                </a:ln>
+                <a:solidFill>
+                  <a:srgbClr val="FFFF00"/>
+                </a:solidFill>
+                <a:effectLst>
+                  <a:outerShdw blurRad="41275" dist="20320" dir="1800000" algn="tl" rotWithShape="0">
+                    <a:srgbClr val="000000">
+                      <a:alpha val="40000"/>
+                    </a:srgbClr>
+                  </a:outerShdw>
+                </a:effectLst>
+              </a:rPr>
+              <a:t>&gt;</a:t>
+            </a:r>
+            <a:endParaRPr lang="en-US" sz="3200" b="1" cap="none" spc="0" dirty="0">
+              <a:ln w="12700">
+                <a:solidFill>
+                  <a:schemeClr val="tx2">
+                    <a:satMod val="155000"/>
+                  </a:schemeClr>
+                </a:solidFill>
+                <a:prstDash val="solid"/>
+              </a:ln>
+              <a:solidFill>
+                <a:srgbClr val="FFFF00"/>
+              </a:solidFill>
+              <a:effectLst>
+                <a:outerShdw blurRad="41275" dist="20320" dir="1800000" algn="tl" rotWithShape="0">
+                  <a:srgbClr val="000000">
+                    <a:alpha val="40000"/>
+                  </a:srgbClr>
+                </a:outerShdw>
+              </a:effectLst>
+            </a:endParaRPr>
+          </a:p>
+        </p:txBody>
+      </p:sp>
+      <p:sp>
+        <p:nvSpPr>
+          <p:cNvPr id="22" name="Rectangle 21"/>
+          <p:cNvSpPr/>
+          <p:nvPr/>
+        </p:nvSpPr>
+        <p:spPr>
+          <a:xfrm>
+            <a:off x="1057949" y="329625"/>
+            <a:ext cx="389851" cy="584775"/>
+          </a:xfrm>
+          <a:prstGeom prst="rect">
+            <a:avLst/>
+          </a:prstGeom>
+          <a:solidFill>
+            <a:srgbClr val="C00000"/>
+          </a:solidFill>
+          <a:ln>
+            <a:solidFill>
+              <a:schemeClr val="tx1"/>
+            </a:solidFill>
+          </a:ln>
+          <a:effectLst/>
+        </p:spPr>
+        <p:txBody>
+          <a:bodyPr wrap="none" lIns="91440" tIns="45720" rIns="91440" bIns="45720">
+            <a:spAutoFit/>
+          </a:bodyPr>
+          <a:lstStyle/>
+          <a:p>
+            <a:pPr algn="ctr"/>
+            <a:r>
+              <a:rPr lang="en-US" sz="3200" b="1" dirty="0">
+                <a:ln w="12700">
+                  <a:solidFill>
+                    <a:schemeClr val="tx2">
+                      <a:satMod val="155000"/>
+                    </a:schemeClr>
+                  </a:solidFill>
+                  <a:prstDash val="solid"/>
+                </a:ln>
+                <a:solidFill>
+                  <a:srgbClr val="FFFF00"/>
+                </a:solidFill>
+                <a:effectLst>
+                  <a:outerShdw blurRad="41275" dist="20320" dir="1800000" algn="tl" rotWithShape="0">
+                    <a:srgbClr val="000000">
+                      <a:alpha val="40000"/>
+                    </a:srgbClr>
+                  </a:outerShdw>
+                </a:effectLst>
+              </a:rPr>
+              <a:t>=</a:t>
+            </a:r>
+            <a:endParaRPr lang="en-US" sz="3200" b="1" cap="none" spc="0" dirty="0">
+              <a:ln w="12700">
+                <a:solidFill>
+                  <a:schemeClr val="tx2">
+                    <a:satMod val="155000"/>
+                  </a:schemeClr>
+                </a:solidFill>
+                <a:prstDash val="solid"/>
+              </a:ln>
+              <a:solidFill>
+                <a:srgbClr val="FFFF00"/>
+              </a:solidFill>
+              <a:effectLst>
+                <a:outerShdw blurRad="41275" dist="20320" dir="1800000" algn="tl" rotWithShape="0">
+                  <a:srgbClr val="000000">
+                    <a:alpha val="40000"/>
+                  </a:srgbClr>
+                </a:outerShdw>
+              </a:effectLst>
+            </a:endParaRPr>
+          </a:p>
+        </p:txBody>
+      </p:sp>
+      <p:sp>
+        <p:nvSpPr>
+          <p:cNvPr id="23" name="Rectangle 22"/>
+          <p:cNvSpPr/>
+          <p:nvPr/>
+        </p:nvSpPr>
+        <p:spPr>
+          <a:xfrm>
+            <a:off x="1843364" y="329624"/>
+            <a:ext cx="595036" cy="584775"/>
+          </a:xfrm>
+          <a:prstGeom prst="rect">
+            <a:avLst/>
+          </a:prstGeom>
+          <a:solidFill>
+            <a:srgbClr val="C00000"/>
+          </a:solidFill>
+          <a:ln>
+            <a:solidFill>
+              <a:schemeClr val="tx1"/>
+            </a:solidFill>
+          </a:ln>
+          <a:effectLst/>
+        </p:spPr>
+        <p:txBody>
+          <a:bodyPr wrap="none" lIns="91440" tIns="45720" rIns="91440" bIns="45720">
+            <a:spAutoFit/>
+          </a:bodyPr>
+          <a:lstStyle/>
+          <a:p>
+            <a:pPr algn="ctr"/>
+            <a:r>
+              <a:rPr lang="en-US" sz="3200" b="1" dirty="0" smtClean="0">
+                <a:ln w="12700">
+                  <a:solidFill>
+                    <a:schemeClr val="tx2">
+                      <a:satMod val="155000"/>
+                    </a:schemeClr>
+                  </a:solidFill>
+                  <a:prstDash val="solid"/>
+                </a:ln>
+                <a:solidFill>
+                  <a:srgbClr val="FFFF00"/>
+                </a:solidFill>
+                <a:effectLst>
+                  <a:outerShdw blurRad="41275" dist="20320" dir="1800000" algn="tl" rotWithShape="0">
+                    <a:srgbClr val="000000">
+                      <a:alpha val="40000"/>
+                    </a:srgbClr>
+                  </a:outerShdw>
+                </a:effectLst>
+              </a:rPr>
+              <a:t>*=</a:t>
+            </a:r>
+            <a:endParaRPr lang="en-US" sz="3200" b="1" cap="none" spc="0" dirty="0">
+              <a:ln w="12700">
+                <a:solidFill>
+                  <a:schemeClr val="tx2">
+                    <a:satMod val="155000"/>
+                  </a:schemeClr>
+                </a:solidFill>
+                <a:prstDash val="solid"/>
+              </a:ln>
+              <a:solidFill>
+                <a:srgbClr val="FFFF00"/>
+              </a:solidFill>
+              <a:effectLst>
+                <a:outerShdw blurRad="41275" dist="20320" dir="1800000" algn="tl" rotWithShape="0">
+                  <a:srgbClr val="000000">
+                    <a:alpha val="40000"/>
+                  </a:srgbClr>
+                </a:outerShdw>
+              </a:effectLst>
+            </a:endParaRPr>
+          </a:p>
+        </p:txBody>
+      </p:sp>
+      <p:sp>
+        <p:nvSpPr>
+          <p:cNvPr id="24" name="Rectangle 23"/>
+          <p:cNvSpPr/>
+          <p:nvPr/>
+        </p:nvSpPr>
+        <p:spPr>
+          <a:xfrm>
+            <a:off x="2774481" y="329623"/>
+            <a:ext cx="595036" cy="584775"/>
+          </a:xfrm>
+          <a:prstGeom prst="rect">
+            <a:avLst/>
+          </a:prstGeom>
+          <a:solidFill>
+            <a:srgbClr val="C00000"/>
+          </a:solidFill>
+          <a:ln>
+            <a:solidFill>
+              <a:schemeClr val="tx1"/>
+            </a:solidFill>
+          </a:ln>
+          <a:effectLst/>
+        </p:spPr>
+        <p:txBody>
+          <a:bodyPr wrap="none" lIns="91440" tIns="45720" rIns="91440" bIns="45720">
+            <a:spAutoFit/>
+          </a:bodyPr>
+          <a:lstStyle/>
+          <a:p>
+            <a:pPr algn="ctr"/>
+            <a:r>
+              <a:rPr lang="en-US" sz="3200" b="1" dirty="0">
+                <a:ln w="12700">
+                  <a:solidFill>
+                    <a:schemeClr val="tx2">
+                      <a:satMod val="155000"/>
+                    </a:schemeClr>
+                  </a:solidFill>
+                  <a:prstDash val="solid"/>
+                </a:ln>
+                <a:solidFill>
+                  <a:srgbClr val="FFFF00"/>
+                </a:solidFill>
+                <a:effectLst>
+                  <a:outerShdw blurRad="41275" dist="20320" dir="1800000" algn="tl" rotWithShape="0">
+                    <a:srgbClr val="000000">
+                      <a:alpha val="40000"/>
+                    </a:srgbClr>
+                  </a:outerShdw>
+                </a:effectLst>
+              </a:rPr>
+              <a:t>+</a:t>
+            </a:r>
+            <a:r>
+              <a:rPr lang="en-US" sz="3200" b="1" dirty="0" smtClean="0">
+                <a:ln w="12700">
+                  <a:solidFill>
+                    <a:schemeClr val="tx2">
+                      <a:satMod val="155000"/>
+                    </a:schemeClr>
+                  </a:solidFill>
+                  <a:prstDash val="solid"/>
+                </a:ln>
+                <a:solidFill>
+                  <a:srgbClr val="FFFF00"/>
+                </a:solidFill>
+                <a:effectLst>
+                  <a:outerShdw blurRad="41275" dist="20320" dir="1800000" algn="tl" rotWithShape="0">
+                    <a:srgbClr val="000000">
+                      <a:alpha val="40000"/>
+                    </a:srgbClr>
+                  </a:outerShdw>
+                </a:effectLst>
+              </a:rPr>
+              <a:t>=</a:t>
+            </a:r>
+            <a:endParaRPr lang="en-US" sz="3200" b="1" cap="none" spc="0" dirty="0">
+              <a:ln w="12700">
+                <a:solidFill>
+                  <a:schemeClr val="tx2">
+                    <a:satMod val="155000"/>
+                  </a:schemeClr>
+                </a:solidFill>
+                <a:prstDash val="solid"/>
+              </a:ln>
+              <a:solidFill>
+                <a:srgbClr val="FFFF00"/>
+              </a:solidFill>
+              <a:effectLst>
+                <a:outerShdw blurRad="41275" dist="20320" dir="1800000" algn="tl" rotWithShape="0">
+                  <a:srgbClr val="000000">
+                    <a:alpha val="40000"/>
+                  </a:srgbClr>
+                </a:outerShdw>
+              </a:effectLst>
+            </a:endParaRPr>
+          </a:p>
+        </p:txBody>
+      </p:sp>
+      <p:sp>
+        <p:nvSpPr>
+          <p:cNvPr id="25" name="Rectangle 24"/>
+          <p:cNvSpPr/>
+          <p:nvPr/>
+        </p:nvSpPr>
+        <p:spPr>
+          <a:xfrm>
+            <a:off x="3672758" y="329625"/>
+            <a:ext cx="514885" cy="584775"/>
+          </a:xfrm>
+          <a:prstGeom prst="rect">
+            <a:avLst/>
+          </a:prstGeom>
+          <a:solidFill>
+            <a:srgbClr val="C00000"/>
+          </a:solidFill>
+          <a:ln>
+            <a:solidFill>
+              <a:schemeClr val="tx1"/>
+            </a:solidFill>
+          </a:ln>
+          <a:effectLst/>
+        </p:spPr>
+        <p:txBody>
+          <a:bodyPr wrap="none" lIns="91440" tIns="45720" rIns="91440" bIns="45720">
+            <a:spAutoFit/>
+          </a:bodyPr>
+          <a:lstStyle/>
+          <a:p>
+            <a:pPr algn="ctr"/>
+            <a:r>
+              <a:rPr lang="en-US" sz="3200" b="1" dirty="0">
+                <a:ln w="12700">
+                  <a:solidFill>
+                    <a:schemeClr val="tx2">
+                      <a:satMod val="155000"/>
+                    </a:schemeClr>
+                  </a:solidFill>
+                  <a:prstDash val="solid"/>
+                </a:ln>
+                <a:solidFill>
+                  <a:srgbClr val="FFFF00"/>
+                </a:solidFill>
+                <a:effectLst>
+                  <a:outerShdw blurRad="41275" dist="20320" dir="1800000" algn="tl" rotWithShape="0">
+                    <a:srgbClr val="000000">
+                      <a:alpha val="40000"/>
+                    </a:srgbClr>
+                  </a:outerShdw>
+                </a:effectLst>
+              </a:rPr>
+              <a:t>-</a:t>
+            </a:r>
+            <a:r>
+              <a:rPr lang="en-US" sz="3200" b="1" dirty="0" smtClean="0">
+                <a:ln w="12700">
+                  <a:solidFill>
+                    <a:schemeClr val="tx2">
+                      <a:satMod val="155000"/>
+                    </a:schemeClr>
+                  </a:solidFill>
+                  <a:prstDash val="solid"/>
+                </a:ln>
+                <a:solidFill>
+                  <a:srgbClr val="FFFF00"/>
+                </a:solidFill>
+                <a:effectLst>
+                  <a:outerShdw blurRad="41275" dist="20320" dir="1800000" algn="tl" rotWithShape="0">
+                    <a:srgbClr val="000000">
+                      <a:alpha val="40000"/>
+                    </a:srgbClr>
+                  </a:outerShdw>
+                </a:effectLst>
+              </a:rPr>
+              <a:t>=</a:t>
+            </a:r>
+            <a:endParaRPr lang="en-US" sz="3200" b="1" cap="none" spc="0" dirty="0">
+              <a:ln w="12700">
+                <a:solidFill>
+                  <a:schemeClr val="tx2">
+                    <a:satMod val="155000"/>
+                  </a:schemeClr>
+                </a:solidFill>
+                <a:prstDash val="solid"/>
+              </a:ln>
+              <a:solidFill>
+                <a:srgbClr val="FFFF00"/>
+              </a:solidFill>
+              <a:effectLst>
+                <a:outerShdw blurRad="41275" dist="20320" dir="1800000" algn="tl" rotWithShape="0">
+                  <a:srgbClr val="000000">
+                    <a:alpha val="40000"/>
+                  </a:srgbClr>
+                </a:outerShdw>
+              </a:effectLst>
+            </a:endParaRPr>
+          </a:p>
+        </p:txBody>
+      </p:sp>
+      <p:sp>
+        <p:nvSpPr>
+          <p:cNvPr id="26" name="Rectangle 25"/>
+          <p:cNvSpPr/>
+          <p:nvPr/>
+        </p:nvSpPr>
+        <p:spPr>
+          <a:xfrm>
+            <a:off x="920872" y="2286000"/>
+            <a:ext cx="298479" cy="584775"/>
+          </a:xfrm>
+          <a:prstGeom prst="rect">
+            <a:avLst/>
+          </a:prstGeom>
+          <a:solidFill>
+            <a:schemeClr val="tx1"/>
+          </a:solidFill>
+          <a:ln>
+            <a:solidFill>
+              <a:schemeClr val="tx1"/>
+            </a:solidFill>
+          </a:ln>
+          <a:effectLst/>
+        </p:spPr>
+        <p:txBody>
+          <a:bodyPr wrap="none" lIns="91440" tIns="45720" rIns="91440" bIns="45720">
+            <a:spAutoFit/>
+          </a:bodyPr>
+          <a:lstStyle/>
+          <a:p>
+            <a:pPr algn="ctr"/>
+            <a:r>
+              <a:rPr lang="en-US" sz="3200" b="1" cap="none" spc="0" dirty="0" smtClean="0">
+                <a:ln w="12700">
+                  <a:solidFill>
+                    <a:schemeClr val="tx2">
+                      <a:satMod val="155000"/>
+                    </a:schemeClr>
+                  </a:solidFill>
+                  <a:prstDash val="solid"/>
+                </a:ln>
+                <a:solidFill>
+                  <a:srgbClr val="FFFF00"/>
+                </a:solidFill>
+                <a:effectLst>
+                  <a:outerShdw blurRad="41275" dist="20320" dir="1800000" algn="tl" rotWithShape="0">
+                    <a:srgbClr val="000000">
+                      <a:alpha val="40000"/>
+                    </a:srgbClr>
+                  </a:outerShdw>
+                </a:effectLst>
+              </a:rPr>
+              <a:t>;</a:t>
+            </a:r>
+            <a:endParaRPr lang="en-US" sz="3200" b="1" cap="none" spc="0" dirty="0">
+              <a:ln w="12700">
+                <a:solidFill>
+                  <a:schemeClr val="tx2">
+                    <a:satMod val="155000"/>
+                  </a:schemeClr>
+                </a:solidFill>
+                <a:prstDash val="solid"/>
+              </a:ln>
+              <a:solidFill>
+                <a:srgbClr val="FFFF00"/>
+              </a:solidFill>
+              <a:effectLst>
+                <a:outerShdw blurRad="41275" dist="20320" dir="1800000" algn="tl" rotWithShape="0">
+                  <a:srgbClr val="000000">
+                    <a:alpha val="40000"/>
+                  </a:srgbClr>
+                </a:outerShdw>
+              </a:effectLst>
+            </a:endParaRPr>
+          </a:p>
+        </p:txBody>
+      </p:sp>
+      <p:sp>
+        <p:nvSpPr>
+          <p:cNvPr id="27" name="Rectangle 26"/>
+          <p:cNvSpPr/>
+          <p:nvPr/>
+        </p:nvSpPr>
+        <p:spPr>
+          <a:xfrm>
+            <a:off x="1816006" y="2271532"/>
+            <a:ext cx="503664" cy="584775"/>
+          </a:xfrm>
+          <a:prstGeom prst="rect">
+            <a:avLst/>
+          </a:prstGeom>
+          <a:solidFill>
+            <a:schemeClr val="tx1"/>
+          </a:solidFill>
+          <a:ln>
+            <a:solidFill>
+              <a:schemeClr val="tx1"/>
+            </a:solidFill>
+          </a:ln>
+          <a:effectLst/>
+        </p:spPr>
+        <p:txBody>
+          <a:bodyPr wrap="none" lIns="91440" tIns="45720" rIns="91440" bIns="45720">
+            <a:spAutoFit/>
+          </a:bodyPr>
+          <a:lstStyle/>
+          <a:p>
+            <a:pPr algn="ctr"/>
+            <a:r>
+              <a:rPr lang="en-US" sz="3200" b="1" cap="none" spc="0" dirty="0" smtClean="0">
+                <a:ln w="12700">
+                  <a:solidFill>
+                    <a:schemeClr val="tx2">
+                      <a:satMod val="155000"/>
+                    </a:schemeClr>
+                  </a:solidFill>
+                  <a:prstDash val="solid"/>
+                </a:ln>
+                <a:solidFill>
+                  <a:srgbClr val="FFFF00"/>
+                </a:solidFill>
+                <a:effectLst>
+                  <a:outerShdw blurRad="41275" dist="20320" dir="1800000" algn="tl" rotWithShape="0">
+                    <a:srgbClr val="000000">
+                      <a:alpha val="40000"/>
+                    </a:srgbClr>
+                  </a:outerShdw>
+                </a:effectLst>
+              </a:rPr>
+              <a:t>;&gt;</a:t>
+            </a:r>
+            <a:endParaRPr lang="en-US" sz="3200" b="1" cap="none" spc="0" dirty="0">
+              <a:ln w="12700">
+                <a:solidFill>
+                  <a:schemeClr val="tx2">
+                    <a:satMod val="155000"/>
+                  </a:schemeClr>
+                </a:solidFill>
+                <a:prstDash val="solid"/>
+              </a:ln>
+              <a:solidFill>
+                <a:srgbClr val="FFFF00"/>
+              </a:solidFill>
+              <a:effectLst>
+                <a:outerShdw blurRad="41275" dist="20320" dir="1800000" algn="tl" rotWithShape="0">
+                  <a:srgbClr val="000000">
+                    <a:alpha val="40000"/>
+                  </a:srgbClr>
+                </a:outerShdw>
+              </a:effectLst>
+            </a:endParaRPr>
+          </a:p>
+        </p:txBody>
+      </p:sp>
+      <p:sp>
+        <p:nvSpPr>
+          <p:cNvPr id="28" name="Rectangle 27"/>
+          <p:cNvSpPr/>
+          <p:nvPr/>
+        </p:nvSpPr>
+        <p:spPr>
+          <a:xfrm>
+            <a:off x="2865853" y="2286000"/>
+            <a:ext cx="503664" cy="584775"/>
+          </a:xfrm>
+          <a:prstGeom prst="rect">
+            <a:avLst/>
+          </a:prstGeom>
+          <a:solidFill>
+            <a:schemeClr val="tx1"/>
+          </a:solidFill>
+          <a:ln>
+            <a:solidFill>
+              <a:schemeClr val="tx1"/>
+            </a:solidFill>
+          </a:ln>
+          <a:effectLst/>
+        </p:spPr>
+        <p:txBody>
+          <a:bodyPr wrap="none" lIns="91440" tIns="45720" rIns="91440" bIns="45720">
+            <a:spAutoFit/>
+          </a:bodyPr>
+          <a:lstStyle/>
+          <a:p>
+            <a:pPr algn="ctr"/>
+            <a:r>
+              <a:rPr lang="en-US" sz="3200" b="1" dirty="0" smtClean="0">
+                <a:ln w="12700">
+                  <a:solidFill>
+                    <a:schemeClr val="tx2">
+                      <a:satMod val="155000"/>
+                    </a:schemeClr>
+                  </a:solidFill>
+                  <a:prstDash val="solid"/>
+                </a:ln>
+                <a:solidFill>
+                  <a:srgbClr val="FFFF00"/>
+                </a:solidFill>
+                <a:effectLst>
+                  <a:outerShdw blurRad="41275" dist="20320" dir="1800000" algn="tl" rotWithShape="0">
+                    <a:srgbClr val="000000">
+                      <a:alpha val="40000"/>
+                    </a:srgbClr>
+                  </a:outerShdw>
+                </a:effectLst>
+              </a:rPr>
+              <a:t>&lt;;</a:t>
+            </a:r>
+            <a:endParaRPr lang="en-US" sz="3200" b="1" cap="none" spc="0" dirty="0">
+              <a:ln w="12700">
+                <a:solidFill>
+                  <a:schemeClr val="tx2">
+                    <a:satMod val="155000"/>
+                  </a:schemeClr>
+                </a:solidFill>
+                <a:prstDash val="solid"/>
+              </a:ln>
+              <a:solidFill>
+                <a:srgbClr val="FFFF00"/>
+              </a:solidFill>
+              <a:effectLst>
+                <a:outerShdw blurRad="41275" dist="20320" dir="1800000" algn="tl" rotWithShape="0">
+                  <a:srgbClr val="000000">
+                    <a:alpha val="40000"/>
+                  </a:srgbClr>
+                </a:outerShdw>
+              </a:effectLst>
+            </a:endParaRPr>
+          </a:p>
+        </p:txBody>
+      </p:sp>
+      <p:sp>
+        <p:nvSpPr>
+          <p:cNvPr id="29" name="Rectangle 28"/>
+          <p:cNvSpPr/>
+          <p:nvPr/>
+        </p:nvSpPr>
+        <p:spPr>
+          <a:xfrm>
+            <a:off x="3824336" y="2286000"/>
+            <a:ext cx="290464" cy="584775"/>
+          </a:xfrm>
+          <a:prstGeom prst="rect">
+            <a:avLst/>
+          </a:prstGeom>
+          <a:solidFill>
+            <a:schemeClr val="tx1"/>
+          </a:solidFill>
+          <a:ln>
+            <a:solidFill>
+              <a:schemeClr val="tx1"/>
+            </a:solidFill>
+          </a:ln>
+          <a:effectLst/>
+        </p:spPr>
+        <p:txBody>
+          <a:bodyPr wrap="none" lIns="91440" tIns="45720" rIns="91440" bIns="45720">
+            <a:spAutoFit/>
+          </a:bodyPr>
+          <a:lstStyle/>
+          <a:p>
+            <a:pPr algn="ctr"/>
+            <a:r>
+              <a:rPr lang="en-US" sz="3200" b="1" dirty="0">
+                <a:ln w="12700">
+                  <a:solidFill>
+                    <a:schemeClr val="tx2">
+                      <a:satMod val="155000"/>
+                    </a:schemeClr>
+                  </a:solidFill>
+                  <a:prstDash val="solid"/>
+                </a:ln>
+                <a:solidFill>
+                  <a:srgbClr val="FFFF00"/>
+                </a:solidFill>
+                <a:effectLst>
+                  <a:outerShdw blurRad="41275" dist="20320" dir="1800000" algn="tl" rotWithShape="0">
+                    <a:srgbClr val="000000">
+                      <a:alpha val="40000"/>
+                    </a:srgbClr>
+                  </a:outerShdw>
+                </a:effectLst>
+              </a:rPr>
+              <a:t>,</a:t>
+            </a:r>
+            <a:endParaRPr lang="en-US" sz="3200" b="1" cap="none" spc="0" dirty="0">
+              <a:ln w="12700">
+                <a:solidFill>
+                  <a:schemeClr val="tx2">
+                    <a:satMod val="155000"/>
+                  </a:schemeClr>
+                </a:solidFill>
+                <a:prstDash val="solid"/>
+              </a:ln>
+              <a:solidFill>
+                <a:srgbClr val="FFFF00"/>
+              </a:solidFill>
+              <a:effectLst>
+                <a:outerShdw blurRad="41275" dist="20320" dir="1800000" algn="tl" rotWithShape="0">
+                  <a:srgbClr val="000000">
+                    <a:alpha val="40000"/>
+                  </a:srgbClr>
+                </a:outerShdw>
+              </a:effectLst>
+            </a:endParaRPr>
+          </a:p>
+        </p:txBody>
+      </p:sp>
+      <p:sp>
+        <p:nvSpPr>
+          <p:cNvPr id="30" name="Rectangle 29"/>
+          <p:cNvSpPr/>
+          <p:nvPr/>
+        </p:nvSpPr>
+        <p:spPr>
+          <a:xfrm>
+            <a:off x="4657764" y="329625"/>
+            <a:ext cx="600036" cy="584775"/>
+          </a:xfrm>
+          <a:prstGeom prst="rect">
+            <a:avLst/>
+          </a:prstGeom>
+          <a:solidFill>
+            <a:srgbClr val="C00000"/>
+          </a:solidFill>
+          <a:ln>
+            <a:solidFill>
+              <a:schemeClr val="tx1"/>
+            </a:solidFill>
+          </a:ln>
+          <a:effectLst/>
+        </p:spPr>
+        <p:txBody>
+          <a:bodyPr wrap="none" lIns="91440" tIns="45720" rIns="91440" bIns="45720">
+            <a:spAutoFit/>
+          </a:bodyPr>
+          <a:lstStyle/>
+          <a:p>
+            <a:pPr algn="ctr"/>
+            <a:r>
+              <a:rPr lang="en-US" sz="3200" b="1" dirty="0" smtClean="0">
+                <a:ln w="12700">
+                  <a:solidFill>
+                    <a:schemeClr val="tx2">
+                      <a:satMod val="155000"/>
+                    </a:schemeClr>
+                  </a:solidFill>
+                  <a:prstDash val="solid"/>
+                </a:ln>
+                <a:solidFill>
+                  <a:srgbClr val="FFFF00"/>
+                </a:solidFill>
+                <a:effectLst>
+                  <a:outerShdw blurRad="41275" dist="20320" dir="1800000" algn="tl" rotWithShape="0">
+                    <a:srgbClr val="000000">
+                      <a:alpha val="40000"/>
+                    </a:srgbClr>
+                  </a:outerShdw>
+                </a:effectLst>
+              </a:rPr>
+              <a:t>++</a:t>
+            </a:r>
+            <a:endParaRPr lang="en-US" sz="3200" b="1" cap="none" spc="0" dirty="0">
+              <a:ln w="12700">
+                <a:solidFill>
+                  <a:schemeClr val="tx2">
+                    <a:satMod val="155000"/>
+                  </a:schemeClr>
+                </a:solidFill>
+                <a:prstDash val="solid"/>
+              </a:ln>
+              <a:solidFill>
+                <a:srgbClr val="FFFF00"/>
+              </a:solidFill>
+              <a:effectLst>
+                <a:outerShdw blurRad="41275" dist="20320" dir="1800000" algn="tl" rotWithShape="0">
+                  <a:srgbClr val="000000">
+                    <a:alpha val="40000"/>
+                  </a:srgbClr>
+                </a:outerShdw>
+              </a:effectLst>
+            </a:endParaRPr>
+          </a:p>
+        </p:txBody>
+      </p:sp>
+      <p:sp>
+        <p:nvSpPr>
+          <p:cNvPr id="31" name="Rectangle 30"/>
+          <p:cNvSpPr/>
+          <p:nvPr/>
+        </p:nvSpPr>
+        <p:spPr>
+          <a:xfrm>
+            <a:off x="5638800" y="329622"/>
+            <a:ext cx="434734" cy="584775"/>
+          </a:xfrm>
+          <a:prstGeom prst="rect">
+            <a:avLst/>
+          </a:prstGeom>
+          <a:solidFill>
+            <a:srgbClr val="C00000"/>
+          </a:solidFill>
+          <a:ln>
+            <a:solidFill>
+              <a:schemeClr val="tx1"/>
+            </a:solidFill>
+          </a:ln>
+          <a:effectLst/>
+        </p:spPr>
+        <p:txBody>
+          <a:bodyPr wrap="none" lIns="91440" tIns="45720" rIns="91440" bIns="45720">
+            <a:spAutoFit/>
+          </a:bodyPr>
+          <a:lstStyle/>
+          <a:p>
+            <a:pPr algn="ctr"/>
+            <a:r>
+              <a:rPr lang="en-US" sz="3200" b="1" dirty="0" smtClean="0">
+                <a:ln w="12700">
+                  <a:solidFill>
+                    <a:schemeClr val="tx2">
+                      <a:satMod val="155000"/>
+                    </a:schemeClr>
+                  </a:solidFill>
+                  <a:prstDash val="solid"/>
+                </a:ln>
+                <a:solidFill>
+                  <a:srgbClr val="FFFF00"/>
+                </a:solidFill>
+                <a:effectLst>
+                  <a:outerShdw blurRad="41275" dist="20320" dir="1800000" algn="tl" rotWithShape="0">
+                    <a:srgbClr val="000000">
+                      <a:alpha val="40000"/>
+                    </a:srgbClr>
+                  </a:outerShdw>
+                </a:effectLst>
+              </a:rPr>
+              <a:t>--</a:t>
+            </a:r>
+            <a:endParaRPr lang="en-US" sz="3200" b="1" cap="none" spc="0" dirty="0">
+              <a:ln w="12700">
+                <a:solidFill>
+                  <a:schemeClr val="tx2">
+                    <a:satMod val="155000"/>
+                  </a:schemeClr>
+                </a:solidFill>
+                <a:prstDash val="solid"/>
+              </a:ln>
+              <a:solidFill>
+                <a:srgbClr val="FFFF00"/>
+              </a:solidFill>
+              <a:effectLst>
+                <a:outerShdw blurRad="41275" dist="20320" dir="1800000" algn="tl" rotWithShape="0">
+                  <a:srgbClr val="000000">
+                    <a:alpha val="40000"/>
+                  </a:srgbClr>
+                </a:outerShdw>
+              </a:effectLst>
+            </a:endParaRPr>
+          </a:p>
+        </p:txBody>
+      </p:sp>
+      <p:sp>
+        <p:nvSpPr>
+          <p:cNvPr id="32" name="Rectangle 31"/>
+          <p:cNvSpPr/>
+          <p:nvPr/>
+        </p:nvSpPr>
+        <p:spPr>
+          <a:xfrm>
+            <a:off x="838200" y="3276600"/>
+            <a:ext cx="595036" cy="584775"/>
+          </a:xfrm>
+          <a:prstGeom prst="rect">
+            <a:avLst/>
+          </a:prstGeom>
+          <a:solidFill>
+            <a:srgbClr val="FFFF00"/>
+          </a:solidFill>
+          <a:ln>
+            <a:solidFill>
+              <a:schemeClr val="tx1"/>
+            </a:solidFill>
+          </a:ln>
+          <a:effectLst/>
+        </p:spPr>
+        <p:txBody>
+          <a:bodyPr wrap="none" lIns="91440" tIns="45720" rIns="91440" bIns="45720">
+            <a:spAutoFit/>
+          </a:bodyPr>
+          <a:lstStyle/>
+          <a:p>
+            <a:pPr algn="ctr"/>
+            <a:r>
+              <a:rPr lang="en-US" sz="3200" b="1" dirty="0" smtClean="0">
+                <a:ln w="12700">
+                  <a:solidFill>
+                    <a:schemeClr val="tx2">
+                      <a:satMod val="155000"/>
+                    </a:schemeClr>
+                  </a:solidFill>
+                  <a:prstDash val="solid"/>
+                </a:ln>
+                <a:effectLst>
+                  <a:outerShdw blurRad="41275" dist="20320" dir="1800000" algn="tl" rotWithShape="0">
+                    <a:srgbClr val="000000">
+                      <a:alpha val="40000"/>
+                    </a:srgbClr>
+                  </a:outerShdw>
+                </a:effectLst>
+              </a:rPr>
+              <a:t>=</a:t>
+            </a:r>
+            <a:r>
+              <a:rPr lang="en-US" sz="3200" b="1" dirty="0">
+                <a:ln w="12700">
+                  <a:solidFill>
+                    <a:schemeClr val="tx2">
+                      <a:satMod val="155000"/>
+                    </a:schemeClr>
+                  </a:solidFill>
+                  <a:prstDash val="solid"/>
+                </a:ln>
+                <a:effectLst>
+                  <a:outerShdw blurRad="41275" dist="20320" dir="1800000" algn="tl" rotWithShape="0">
+                    <a:srgbClr val="000000">
+                      <a:alpha val="40000"/>
+                    </a:srgbClr>
+                  </a:outerShdw>
+                </a:effectLst>
+              </a:rPr>
+              <a:t>&gt;</a:t>
+            </a:r>
+            <a:endParaRPr lang="en-US" sz="3200" b="1" cap="none" spc="0" dirty="0">
+              <a:ln w="12700">
+                <a:solidFill>
+                  <a:schemeClr val="tx2">
+                    <a:satMod val="155000"/>
+                  </a:schemeClr>
+                </a:solidFill>
+                <a:prstDash val="solid"/>
+              </a:ln>
+              <a:effectLst>
+                <a:outerShdw blurRad="41275" dist="20320" dir="1800000" algn="tl" rotWithShape="0">
+                  <a:srgbClr val="000000">
+                    <a:alpha val="40000"/>
+                  </a:srgbClr>
+                </a:outerShdw>
+              </a:effectLst>
+            </a:endParaRPr>
+          </a:p>
+        </p:txBody>
+      </p:sp>
+      <p:sp>
+        <p:nvSpPr>
+          <p:cNvPr id="34" name="Rectangle 33"/>
+          <p:cNvSpPr/>
+          <p:nvPr/>
+        </p:nvSpPr>
+        <p:spPr>
+          <a:xfrm>
+            <a:off x="1843364" y="3276599"/>
+            <a:ext cx="389850" cy="584775"/>
+          </a:xfrm>
+          <a:prstGeom prst="rect">
+            <a:avLst/>
+          </a:prstGeom>
+          <a:solidFill>
+            <a:schemeClr val="accent1">
+              <a:lumMod val="40000"/>
+              <a:lumOff val="60000"/>
+            </a:schemeClr>
+          </a:solidFill>
+          <a:ln>
+            <a:solidFill>
+              <a:schemeClr val="tx1"/>
+            </a:solidFill>
+          </a:ln>
+          <a:effectLst/>
+        </p:spPr>
+        <p:txBody>
+          <a:bodyPr wrap="none" lIns="91440" tIns="45720" rIns="91440" bIns="45720">
+            <a:spAutoFit/>
+          </a:bodyPr>
+          <a:lstStyle/>
+          <a:p>
+            <a:pPr algn="ctr"/>
+            <a:r>
+              <a:rPr lang="en-US" sz="3200" b="1" dirty="0" smtClean="0">
+                <a:ln w="12700">
+                  <a:solidFill>
+                    <a:schemeClr val="tx2">
+                      <a:satMod val="155000"/>
+                    </a:schemeClr>
+                  </a:solidFill>
+                  <a:prstDash val="solid"/>
+                </a:ln>
+                <a:solidFill>
+                  <a:srgbClr val="FFFF00"/>
+                </a:solidFill>
+                <a:effectLst>
+                  <a:outerShdw blurRad="41275" dist="20320" dir="1800000" algn="tl" rotWithShape="0">
+                    <a:srgbClr val="000000">
+                      <a:alpha val="40000"/>
+                    </a:srgbClr>
+                  </a:outerShdw>
+                </a:effectLst>
+              </a:rPr>
+              <a:t>+</a:t>
+            </a:r>
+            <a:endParaRPr lang="en-US" sz="3200" b="1" cap="none" spc="0" dirty="0">
+              <a:ln w="12700">
+                <a:solidFill>
+                  <a:schemeClr val="tx2">
+                    <a:satMod val="155000"/>
+                  </a:schemeClr>
+                </a:solidFill>
+                <a:prstDash val="solid"/>
+              </a:ln>
+              <a:solidFill>
+                <a:srgbClr val="FFFF00"/>
+              </a:solidFill>
+              <a:effectLst>
+                <a:outerShdw blurRad="41275" dist="20320" dir="1800000" algn="tl" rotWithShape="0">
+                  <a:srgbClr val="000000">
+                    <a:alpha val="40000"/>
+                  </a:srgbClr>
+                </a:outerShdw>
+              </a:effectLst>
+            </a:endParaRPr>
+          </a:p>
+        </p:txBody>
+      </p:sp>
+      <p:sp>
+        <p:nvSpPr>
+          <p:cNvPr id="35" name="Rectangle 34"/>
+          <p:cNvSpPr/>
+          <p:nvPr/>
+        </p:nvSpPr>
+        <p:spPr>
+          <a:xfrm>
+            <a:off x="2731926" y="3276599"/>
+            <a:ext cx="309700" cy="584775"/>
+          </a:xfrm>
+          <a:prstGeom prst="rect">
+            <a:avLst/>
+          </a:prstGeom>
+          <a:solidFill>
+            <a:schemeClr val="accent1">
+              <a:lumMod val="40000"/>
+              <a:lumOff val="60000"/>
+            </a:schemeClr>
+          </a:solidFill>
+          <a:ln>
+            <a:solidFill>
+              <a:schemeClr val="tx1"/>
+            </a:solidFill>
+          </a:ln>
+          <a:effectLst/>
+        </p:spPr>
+        <p:txBody>
+          <a:bodyPr wrap="none" lIns="91440" tIns="45720" rIns="91440" bIns="45720">
+            <a:spAutoFit/>
+          </a:bodyPr>
+          <a:lstStyle/>
+          <a:p>
+            <a:pPr algn="ctr"/>
+            <a:r>
+              <a:rPr lang="en-US" sz="3200" b="1" dirty="0" smtClean="0">
+                <a:ln w="12700">
+                  <a:solidFill>
+                    <a:schemeClr val="tx2">
+                      <a:satMod val="155000"/>
+                    </a:schemeClr>
+                  </a:solidFill>
+                  <a:prstDash val="solid"/>
+                </a:ln>
+                <a:solidFill>
+                  <a:srgbClr val="FFFF00"/>
+                </a:solidFill>
+                <a:effectLst>
+                  <a:outerShdw blurRad="41275" dist="20320" dir="1800000" algn="tl" rotWithShape="0">
+                    <a:srgbClr val="000000">
+                      <a:alpha val="40000"/>
+                    </a:srgbClr>
+                  </a:outerShdw>
+                </a:effectLst>
+              </a:rPr>
+              <a:t>-</a:t>
+            </a:r>
+            <a:endParaRPr lang="en-US" sz="3200" b="1" cap="none" spc="0" dirty="0">
+              <a:ln w="12700">
+                <a:solidFill>
+                  <a:schemeClr val="tx2">
+                    <a:satMod val="155000"/>
+                  </a:schemeClr>
+                </a:solidFill>
+                <a:prstDash val="solid"/>
+              </a:ln>
+              <a:solidFill>
+                <a:srgbClr val="FFFF00"/>
+              </a:solidFill>
+              <a:effectLst>
+                <a:outerShdw blurRad="41275" dist="20320" dir="1800000" algn="tl" rotWithShape="0">
+                  <a:srgbClr val="000000">
+                    <a:alpha val="40000"/>
+                  </a:srgbClr>
+                </a:outerShdw>
+              </a:effectLst>
+            </a:endParaRPr>
+          </a:p>
+        </p:txBody>
+      </p:sp>
+      <p:sp>
+        <p:nvSpPr>
+          <p:cNvPr id="36" name="Rectangle 35"/>
+          <p:cNvSpPr/>
+          <p:nvPr/>
+        </p:nvSpPr>
+        <p:spPr>
+          <a:xfrm>
+            <a:off x="3522426" y="3276599"/>
+            <a:ext cx="389851" cy="584775"/>
+          </a:xfrm>
+          <a:prstGeom prst="rect">
+            <a:avLst/>
+          </a:prstGeom>
+          <a:solidFill>
+            <a:schemeClr val="accent1">
+              <a:lumMod val="40000"/>
+              <a:lumOff val="60000"/>
+            </a:schemeClr>
+          </a:solidFill>
+          <a:ln>
+            <a:solidFill>
+              <a:schemeClr val="tx1"/>
+            </a:solidFill>
+          </a:ln>
+          <a:effectLst/>
+        </p:spPr>
+        <p:txBody>
+          <a:bodyPr wrap="none" lIns="91440" tIns="45720" rIns="91440" bIns="45720">
+            <a:spAutoFit/>
+          </a:bodyPr>
+          <a:lstStyle/>
+          <a:p>
+            <a:pPr algn="ctr"/>
+            <a:r>
+              <a:rPr lang="en-US" sz="3200" b="1" dirty="0">
+                <a:ln w="12700">
+                  <a:solidFill>
+                    <a:schemeClr val="tx2">
+                      <a:satMod val="155000"/>
+                    </a:schemeClr>
+                  </a:solidFill>
+                  <a:prstDash val="solid"/>
+                </a:ln>
+                <a:solidFill>
+                  <a:srgbClr val="FFFF00"/>
+                </a:solidFill>
+                <a:effectLst>
+                  <a:outerShdw blurRad="41275" dist="20320" dir="1800000" algn="tl" rotWithShape="0">
+                    <a:srgbClr val="000000">
+                      <a:alpha val="40000"/>
+                    </a:srgbClr>
+                  </a:outerShdw>
+                </a:effectLst>
+              </a:rPr>
+              <a:t>*</a:t>
+            </a:r>
+            <a:endParaRPr lang="en-US" sz="3200" b="1" cap="none" spc="0" dirty="0">
+              <a:ln w="12700">
+                <a:solidFill>
+                  <a:schemeClr val="tx2">
+                    <a:satMod val="155000"/>
+                  </a:schemeClr>
+                </a:solidFill>
+                <a:prstDash val="solid"/>
+              </a:ln>
+              <a:solidFill>
+                <a:srgbClr val="FFFF00"/>
+              </a:solidFill>
+              <a:effectLst>
+                <a:outerShdw blurRad="41275" dist="20320" dir="1800000" algn="tl" rotWithShape="0">
+                  <a:srgbClr val="000000">
+                    <a:alpha val="40000"/>
+                  </a:srgbClr>
+                </a:outerShdw>
+              </a:effectLst>
+            </a:endParaRPr>
+          </a:p>
+        </p:txBody>
+      </p:sp>
+      <p:sp>
+        <p:nvSpPr>
+          <p:cNvPr id="37" name="Rectangle 36"/>
+          <p:cNvSpPr/>
+          <p:nvPr/>
+        </p:nvSpPr>
+        <p:spPr>
+          <a:xfrm>
+            <a:off x="4316970" y="3262131"/>
+            <a:ext cx="360996" cy="584775"/>
+          </a:xfrm>
+          <a:prstGeom prst="rect">
+            <a:avLst/>
+          </a:prstGeom>
+          <a:solidFill>
+            <a:schemeClr val="accent1">
+              <a:lumMod val="40000"/>
+              <a:lumOff val="60000"/>
+            </a:schemeClr>
+          </a:solidFill>
+          <a:ln>
+            <a:solidFill>
+              <a:schemeClr val="tx1"/>
+            </a:solidFill>
+          </a:ln>
+          <a:effectLst/>
+        </p:spPr>
+        <p:txBody>
+          <a:bodyPr wrap="none" lIns="91440" tIns="45720" rIns="91440" bIns="45720">
+            <a:spAutoFit/>
+          </a:bodyPr>
+          <a:lstStyle/>
+          <a:p>
+            <a:pPr algn="ctr"/>
+            <a:r>
+              <a:rPr lang="en-US" sz="3200" b="1" dirty="0" smtClean="0">
+                <a:ln w="12700">
+                  <a:solidFill>
+                    <a:schemeClr val="tx2">
+                      <a:satMod val="155000"/>
+                    </a:schemeClr>
+                  </a:solidFill>
+                  <a:prstDash val="solid"/>
+                </a:ln>
+                <a:solidFill>
+                  <a:srgbClr val="FFFF00"/>
+                </a:solidFill>
+                <a:effectLst>
+                  <a:outerShdw blurRad="41275" dist="20320" dir="1800000" algn="tl" rotWithShape="0">
+                    <a:srgbClr val="000000">
+                      <a:alpha val="40000"/>
+                    </a:srgbClr>
+                  </a:outerShdw>
+                </a:effectLst>
+              </a:rPr>
+              <a:t>/</a:t>
+            </a:r>
+            <a:endParaRPr lang="en-US" sz="3200" b="1" cap="none" spc="0" dirty="0">
+              <a:ln w="12700">
+                <a:solidFill>
+                  <a:schemeClr val="tx2">
+                    <a:satMod val="155000"/>
+                  </a:schemeClr>
+                </a:solidFill>
+                <a:prstDash val="solid"/>
+              </a:ln>
+              <a:solidFill>
+                <a:srgbClr val="FFFF00"/>
+              </a:solidFill>
+              <a:effectLst>
+                <a:outerShdw blurRad="41275" dist="20320" dir="1800000" algn="tl" rotWithShape="0">
+                  <a:srgbClr val="000000">
+                    <a:alpha val="40000"/>
+                  </a:srgbClr>
+                </a:outerShdw>
+              </a:effectLst>
+            </a:endParaRPr>
+          </a:p>
+        </p:txBody>
+      </p:sp>
+      <p:sp>
+        <p:nvSpPr>
+          <p:cNvPr id="38" name="Rectangle 37"/>
+          <p:cNvSpPr/>
+          <p:nvPr/>
+        </p:nvSpPr>
+        <p:spPr>
+          <a:xfrm>
+            <a:off x="5025235" y="3276599"/>
+            <a:ext cx="484428" cy="584775"/>
+          </a:xfrm>
+          <a:prstGeom prst="rect">
+            <a:avLst/>
+          </a:prstGeom>
+          <a:solidFill>
+            <a:schemeClr val="accent1">
+              <a:lumMod val="40000"/>
+              <a:lumOff val="60000"/>
+            </a:schemeClr>
+          </a:solidFill>
+          <a:ln>
+            <a:solidFill>
+              <a:schemeClr val="tx1"/>
+            </a:solidFill>
+          </a:ln>
+          <a:effectLst/>
+        </p:spPr>
+        <p:txBody>
+          <a:bodyPr wrap="none" lIns="91440" tIns="45720" rIns="91440" bIns="45720">
+            <a:spAutoFit/>
+          </a:bodyPr>
+          <a:lstStyle/>
+          <a:p>
+            <a:pPr algn="ctr"/>
+            <a:r>
+              <a:rPr lang="en-US" sz="3200" b="1" dirty="0" smtClean="0">
+                <a:ln w="12700">
+                  <a:solidFill>
+                    <a:schemeClr val="tx2">
+                      <a:satMod val="155000"/>
+                    </a:schemeClr>
+                  </a:solidFill>
+                  <a:prstDash val="solid"/>
+                </a:ln>
+                <a:solidFill>
+                  <a:srgbClr val="FFFF00"/>
+                </a:solidFill>
+                <a:effectLst>
+                  <a:outerShdw blurRad="41275" dist="20320" dir="1800000" algn="tl" rotWithShape="0">
+                    <a:srgbClr val="000000">
+                      <a:alpha val="40000"/>
+                    </a:srgbClr>
+                  </a:outerShdw>
+                </a:effectLst>
+              </a:rPr>
+              <a:t>%</a:t>
+            </a:r>
+            <a:endParaRPr lang="en-US" sz="3200" b="1" cap="none" spc="0" dirty="0">
+              <a:ln w="12700">
+                <a:solidFill>
+                  <a:schemeClr val="tx2">
+                    <a:satMod val="155000"/>
+                  </a:schemeClr>
+                </a:solidFill>
+                <a:prstDash val="solid"/>
+              </a:ln>
+              <a:solidFill>
+                <a:srgbClr val="FFFF00"/>
+              </a:solidFill>
+              <a:effectLst>
+                <a:outerShdw blurRad="41275" dist="20320" dir="1800000" algn="tl" rotWithShape="0">
+                  <a:srgbClr val="000000">
+                    <a:alpha val="40000"/>
+                  </a:srgbClr>
+                </a:outerShdw>
+              </a:effectLst>
+            </a:endParaRPr>
+          </a:p>
+        </p:txBody>
+      </p:sp>
+      <p:sp>
+        <p:nvSpPr>
+          <p:cNvPr id="39" name="Rectangle 38"/>
+          <p:cNvSpPr/>
+          <p:nvPr/>
+        </p:nvSpPr>
+        <p:spPr>
+          <a:xfrm>
+            <a:off x="5923792" y="3276599"/>
+            <a:ext cx="317716" cy="584775"/>
+          </a:xfrm>
+          <a:prstGeom prst="rect">
+            <a:avLst/>
+          </a:prstGeom>
+          <a:solidFill>
+            <a:schemeClr val="accent1">
+              <a:lumMod val="75000"/>
+            </a:schemeClr>
+          </a:solidFill>
+          <a:ln>
+            <a:solidFill>
+              <a:schemeClr val="tx1"/>
+            </a:solidFill>
+          </a:ln>
+          <a:effectLst/>
+        </p:spPr>
+        <p:txBody>
+          <a:bodyPr wrap="none" lIns="91440" tIns="45720" rIns="91440" bIns="45720">
+            <a:spAutoFit/>
+          </a:bodyPr>
+          <a:lstStyle/>
+          <a:p>
+            <a:pPr algn="ctr"/>
+            <a:r>
+              <a:rPr lang="en-US" sz="3200" b="1" dirty="0" smtClean="0">
+                <a:ln w="12700">
+                  <a:solidFill>
+                    <a:schemeClr val="tx2">
+                      <a:satMod val="155000"/>
+                    </a:schemeClr>
+                  </a:solidFill>
+                  <a:prstDash val="solid"/>
+                </a:ln>
+                <a:solidFill>
+                  <a:srgbClr val="FFFF00"/>
+                </a:solidFill>
+                <a:effectLst>
+                  <a:outerShdw blurRad="41275" dist="20320" dir="1800000" algn="tl" rotWithShape="0">
+                    <a:srgbClr val="000000">
+                      <a:alpha val="40000"/>
+                    </a:srgbClr>
+                  </a:outerShdw>
+                </a:effectLst>
+              </a:rPr>
+              <a:t>!</a:t>
+            </a:r>
+            <a:endParaRPr lang="en-US" sz="3200" b="1" cap="none" spc="0" dirty="0">
+              <a:ln w="12700">
+                <a:solidFill>
+                  <a:schemeClr val="tx2">
+                    <a:satMod val="155000"/>
+                  </a:schemeClr>
+                </a:solidFill>
+                <a:prstDash val="solid"/>
+              </a:ln>
+              <a:solidFill>
+                <a:srgbClr val="FFFF00"/>
+              </a:solidFill>
+              <a:effectLst>
+                <a:outerShdw blurRad="41275" dist="20320" dir="1800000" algn="tl" rotWithShape="0">
+                  <a:srgbClr val="000000">
+                    <a:alpha val="40000"/>
+                  </a:srgbClr>
+                </a:outerShdw>
+              </a:effectLst>
+            </a:endParaRPr>
+          </a:p>
+        </p:txBody>
+      </p:sp>
+      <p:sp>
+        <p:nvSpPr>
+          <p:cNvPr id="40" name="Rectangle 39"/>
+          <p:cNvSpPr/>
+          <p:nvPr/>
+        </p:nvSpPr>
+        <p:spPr>
+          <a:xfrm>
+            <a:off x="6647763" y="3276598"/>
+            <a:ext cx="309700" cy="584775"/>
+          </a:xfrm>
+          <a:prstGeom prst="rect">
+            <a:avLst/>
+          </a:prstGeom>
+          <a:solidFill>
+            <a:schemeClr val="accent1">
+              <a:lumMod val="75000"/>
+            </a:schemeClr>
+          </a:solidFill>
+          <a:ln>
+            <a:solidFill>
+              <a:schemeClr val="tx1"/>
+            </a:solidFill>
+          </a:ln>
+          <a:effectLst/>
+        </p:spPr>
+        <p:txBody>
+          <a:bodyPr wrap="none" lIns="91440" tIns="45720" rIns="91440" bIns="45720">
+            <a:spAutoFit/>
+          </a:bodyPr>
+          <a:lstStyle/>
+          <a:p>
+            <a:pPr algn="ctr"/>
+            <a:r>
+              <a:rPr lang="en-US" sz="3200" b="1" dirty="0" smtClean="0">
+                <a:ln w="12700">
+                  <a:solidFill>
+                    <a:schemeClr val="tx2">
+                      <a:satMod val="155000"/>
+                    </a:schemeClr>
+                  </a:solidFill>
+                  <a:prstDash val="solid"/>
+                </a:ln>
+                <a:solidFill>
+                  <a:srgbClr val="FFFF00"/>
+                </a:solidFill>
+                <a:effectLst>
+                  <a:outerShdw blurRad="41275" dist="20320" dir="1800000" algn="tl" rotWithShape="0">
+                    <a:srgbClr val="000000">
+                      <a:alpha val="40000"/>
+                    </a:srgbClr>
+                  </a:outerShdw>
+                </a:effectLst>
+              </a:rPr>
+              <a:t>-</a:t>
+            </a:r>
+            <a:endParaRPr lang="en-US" sz="3200" b="1" cap="none" spc="0" dirty="0">
+              <a:ln w="12700">
+                <a:solidFill>
+                  <a:schemeClr val="tx2">
+                    <a:satMod val="155000"/>
+                  </a:schemeClr>
+                </a:solidFill>
+                <a:prstDash val="solid"/>
+              </a:ln>
+              <a:solidFill>
+                <a:srgbClr val="FFFF00"/>
+              </a:solidFill>
+              <a:effectLst>
+                <a:outerShdw blurRad="41275" dist="20320" dir="1800000" algn="tl" rotWithShape="0">
+                  <a:srgbClr val="000000">
+                    <a:alpha val="40000"/>
+                  </a:srgbClr>
+                </a:outerShdw>
+              </a:effectLst>
+            </a:endParaRPr>
+          </a:p>
+        </p:txBody>
+      </p:sp>
+      <p:sp>
+        <p:nvSpPr>
+          <p:cNvPr id="33" name="Rectangle 32"/>
+          <p:cNvSpPr/>
+          <p:nvPr/>
+        </p:nvSpPr>
+        <p:spPr>
+          <a:xfrm>
+            <a:off x="774794" y="5257800"/>
+            <a:ext cx="1130206" cy="584775"/>
+          </a:xfrm>
+          <a:prstGeom prst="rect">
+            <a:avLst/>
+          </a:prstGeom>
+          <a:solidFill>
+            <a:schemeClr val="accent4">
+              <a:lumMod val="60000"/>
+              <a:lumOff val="40000"/>
+            </a:schemeClr>
+          </a:solidFill>
+          <a:ln>
+            <a:solidFill>
+              <a:schemeClr val="tx1"/>
+            </a:solidFill>
+          </a:ln>
+          <a:effectLst/>
+        </p:spPr>
+        <p:txBody>
+          <a:bodyPr wrap="square" lIns="91440" tIns="45720" rIns="91440" bIns="45720">
+            <a:noAutofit/>
+          </a:bodyPr>
+          <a:lstStyle/>
+          <a:p>
+            <a:pPr algn="ctr"/>
+            <a:r>
+              <a:rPr lang="en-US" sz="3200" b="1" cap="none" spc="0" dirty="0" err="1" smtClean="0">
+                <a:ln w="12700">
+                  <a:solidFill>
+                    <a:schemeClr val="tx2">
+                      <a:satMod val="155000"/>
+                    </a:schemeClr>
+                  </a:solidFill>
+                  <a:prstDash val="solid"/>
+                </a:ln>
+                <a:solidFill>
+                  <a:srgbClr val="FFFF00"/>
+                </a:solidFill>
+                <a:effectLst>
+                  <a:outerShdw blurRad="41275" dist="20320" dir="1800000" algn="tl" rotWithShape="0">
+                    <a:srgbClr val="000000">
+                      <a:alpha val="40000"/>
+                    </a:srgbClr>
+                  </a:outerShdw>
+                </a:effectLst>
+              </a:rPr>
+              <a:t>expr</a:t>
+            </a:r>
+            <a:endParaRPr lang="en-US" sz="3200" b="1" cap="none" spc="0" dirty="0">
+              <a:ln w="12700">
+                <a:solidFill>
+                  <a:schemeClr val="tx2">
+                    <a:satMod val="155000"/>
+                  </a:schemeClr>
+                </a:solidFill>
+                <a:prstDash val="solid"/>
+              </a:ln>
+              <a:solidFill>
+                <a:srgbClr val="FFFF00"/>
+              </a:solidFill>
+              <a:effectLst>
+                <a:outerShdw blurRad="41275" dist="20320" dir="1800000" algn="tl" rotWithShape="0">
+                  <a:srgbClr val="000000">
+                    <a:alpha val="40000"/>
+                  </a:srgbClr>
+                </a:outerShdw>
+              </a:effectLst>
+            </a:endParaRPr>
+          </a:p>
+        </p:txBody>
+      </p:sp>
+      <p:sp>
+        <p:nvSpPr>
+          <p:cNvPr id="44" name="Rectangle 43"/>
+          <p:cNvSpPr/>
+          <p:nvPr/>
+        </p:nvSpPr>
+        <p:spPr>
+          <a:xfrm>
+            <a:off x="763777" y="4267200"/>
+            <a:ext cx="761748" cy="584775"/>
+          </a:xfrm>
+          <a:prstGeom prst="rect">
+            <a:avLst/>
+          </a:prstGeom>
+          <a:solidFill>
+            <a:srgbClr val="FFC000"/>
+          </a:solidFill>
+          <a:ln>
+            <a:solidFill>
+              <a:schemeClr val="tx1"/>
+            </a:solidFill>
+          </a:ln>
+          <a:effectLst/>
+        </p:spPr>
+        <p:txBody>
+          <a:bodyPr wrap="none" lIns="91440" tIns="45720" rIns="91440" bIns="45720">
+            <a:spAutoFit/>
+          </a:bodyPr>
+          <a:lstStyle/>
+          <a:p>
+            <a:pPr algn="ctr"/>
+            <a:r>
+              <a:rPr lang="en-US" sz="3200" b="1" dirty="0" smtClean="0">
+                <a:ln w="12700">
+                  <a:solidFill>
+                    <a:schemeClr val="tx2">
+                      <a:satMod val="155000"/>
+                    </a:schemeClr>
+                  </a:solidFill>
+                  <a:prstDash val="solid"/>
+                </a:ln>
+                <a:solidFill>
+                  <a:schemeClr val="bg1"/>
+                </a:solidFill>
+                <a:effectLst>
+                  <a:outerShdw blurRad="41275" dist="20320" dir="1800000" algn="tl" rotWithShape="0">
+                    <a:srgbClr val="000000">
+                      <a:alpha val="40000"/>
+                    </a:srgbClr>
+                  </a:outerShdw>
+                </a:effectLst>
+              </a:rPr>
+              <a:t>&amp;&amp;</a:t>
+            </a:r>
+            <a:endParaRPr lang="en-US" sz="3200" b="1" cap="none" spc="0" dirty="0">
+              <a:ln w="12700">
+                <a:solidFill>
+                  <a:schemeClr val="tx2">
+                    <a:satMod val="155000"/>
+                  </a:schemeClr>
+                </a:solidFill>
+                <a:prstDash val="solid"/>
+              </a:ln>
+              <a:solidFill>
+                <a:schemeClr val="bg1"/>
+              </a:solidFill>
+              <a:effectLst>
+                <a:outerShdw blurRad="41275" dist="20320" dir="1800000" algn="tl" rotWithShape="0">
+                  <a:srgbClr val="000000">
+                    <a:alpha val="40000"/>
+                  </a:srgbClr>
+                </a:outerShdw>
+              </a:effectLst>
+            </a:endParaRPr>
+          </a:p>
+        </p:txBody>
+      </p:sp>
+      <p:sp>
+        <p:nvSpPr>
+          <p:cNvPr id="45" name="Rectangle 44"/>
+          <p:cNvSpPr/>
+          <p:nvPr/>
+        </p:nvSpPr>
+        <p:spPr>
+          <a:xfrm>
+            <a:off x="1862601" y="4267200"/>
+            <a:ext cx="575799" cy="584775"/>
+          </a:xfrm>
+          <a:prstGeom prst="rect">
+            <a:avLst/>
+          </a:prstGeom>
+          <a:solidFill>
+            <a:srgbClr val="FFC000"/>
+          </a:solidFill>
+          <a:ln>
+            <a:solidFill>
+              <a:schemeClr val="tx1"/>
+            </a:solidFill>
+          </a:ln>
+          <a:effectLst/>
+        </p:spPr>
+        <p:txBody>
+          <a:bodyPr wrap="none" lIns="91440" tIns="45720" rIns="91440" bIns="45720">
+            <a:spAutoFit/>
+          </a:bodyPr>
+          <a:lstStyle/>
+          <a:p>
+            <a:pPr algn="ctr"/>
+            <a:r>
+              <a:rPr lang="en-US" sz="3200" b="1" dirty="0" smtClean="0">
+                <a:ln w="12700">
+                  <a:solidFill>
+                    <a:schemeClr val="tx2">
+                      <a:satMod val="155000"/>
+                    </a:schemeClr>
+                  </a:solidFill>
+                  <a:prstDash val="solid"/>
+                </a:ln>
+                <a:solidFill>
+                  <a:schemeClr val="bg1"/>
+                </a:solidFill>
+                <a:effectLst>
+                  <a:outerShdw blurRad="41275" dist="20320" dir="1800000" algn="tl" rotWithShape="0">
+                    <a:srgbClr val="000000">
+                      <a:alpha val="40000"/>
+                    </a:srgbClr>
+                  </a:outerShdw>
+                </a:effectLst>
+              </a:rPr>
+              <a:t>||</a:t>
+            </a:r>
+            <a:endParaRPr lang="en-US" sz="3200" b="1" cap="none" spc="0" dirty="0">
+              <a:ln w="12700">
+                <a:solidFill>
+                  <a:schemeClr val="tx2">
+                    <a:satMod val="155000"/>
+                  </a:schemeClr>
+                </a:solidFill>
+                <a:prstDash val="solid"/>
+              </a:ln>
+              <a:solidFill>
+                <a:schemeClr val="bg1"/>
+              </a:solidFill>
+              <a:effectLst>
+                <a:outerShdw blurRad="41275" dist="20320" dir="1800000" algn="tl" rotWithShape="0">
+                  <a:srgbClr val="000000">
+                    <a:alpha val="40000"/>
+                  </a:srgbClr>
+                </a:outerShdw>
+              </a:effectLst>
+            </a:endParaRPr>
+          </a:p>
+        </p:txBody>
+      </p:sp>
+      <p:sp>
+        <p:nvSpPr>
+          <p:cNvPr id="51" name="Rectangle 50"/>
+          <p:cNvSpPr/>
+          <p:nvPr/>
+        </p:nvSpPr>
+        <p:spPr>
+          <a:xfrm>
+            <a:off x="2594543" y="5243744"/>
+            <a:ext cx="1130206" cy="584775"/>
+          </a:xfrm>
+          <a:prstGeom prst="rect">
+            <a:avLst/>
+          </a:prstGeom>
+          <a:solidFill>
+            <a:schemeClr val="accent4">
+              <a:lumMod val="60000"/>
+              <a:lumOff val="40000"/>
+            </a:schemeClr>
+          </a:solidFill>
+          <a:ln>
+            <a:solidFill>
+              <a:schemeClr val="tx1"/>
+            </a:solidFill>
+          </a:ln>
+          <a:effectLst/>
+        </p:spPr>
+        <p:txBody>
+          <a:bodyPr wrap="square" lIns="91440" tIns="45720" rIns="91440" bIns="45720">
+            <a:noAutofit/>
+          </a:bodyPr>
+          <a:lstStyle/>
+          <a:p>
+            <a:pPr algn="ctr"/>
+            <a:r>
+              <a:rPr lang="en-US" sz="3200" b="1" cap="none" spc="0" dirty="0" err="1" smtClean="0">
+                <a:ln w="12700">
+                  <a:solidFill>
+                    <a:schemeClr val="tx2">
+                      <a:satMod val="155000"/>
+                    </a:schemeClr>
+                  </a:solidFill>
+                  <a:prstDash val="solid"/>
+                </a:ln>
+                <a:solidFill>
+                  <a:srgbClr val="FFFF00"/>
+                </a:solidFill>
+                <a:effectLst>
+                  <a:outerShdw blurRad="41275" dist="20320" dir="1800000" algn="tl" rotWithShape="0">
+                    <a:srgbClr val="000000">
+                      <a:alpha val="40000"/>
+                    </a:srgbClr>
+                  </a:outerShdw>
+                </a:effectLst>
+              </a:rPr>
+              <a:t>int</a:t>
+            </a:r>
+            <a:endParaRPr lang="en-US" sz="3200" b="1" cap="none" spc="0" dirty="0">
+              <a:ln w="12700">
+                <a:solidFill>
+                  <a:schemeClr val="tx2">
+                    <a:satMod val="155000"/>
+                  </a:schemeClr>
+                </a:solidFill>
+                <a:prstDash val="solid"/>
+              </a:ln>
+              <a:solidFill>
+                <a:srgbClr val="FFFF00"/>
+              </a:solidFill>
+              <a:effectLst>
+                <a:outerShdw blurRad="41275" dist="20320" dir="1800000" algn="tl" rotWithShape="0">
+                  <a:srgbClr val="000000">
+                    <a:alpha val="40000"/>
+                  </a:srgbClr>
+                </a:outerShdw>
+              </a:effectLst>
+            </a:endParaRPr>
+          </a:p>
+        </p:txBody>
+      </p:sp>
+      <p:sp>
+        <p:nvSpPr>
+          <p:cNvPr id="52" name="Rectangle 51"/>
+          <p:cNvSpPr/>
+          <p:nvPr/>
+        </p:nvSpPr>
+        <p:spPr>
+          <a:xfrm>
+            <a:off x="4196221" y="5243743"/>
+            <a:ext cx="1313441" cy="584775"/>
+          </a:xfrm>
+          <a:prstGeom prst="rect">
+            <a:avLst/>
+          </a:prstGeom>
+          <a:solidFill>
+            <a:schemeClr val="accent4">
+              <a:lumMod val="60000"/>
+              <a:lumOff val="40000"/>
+            </a:schemeClr>
+          </a:solidFill>
+          <a:ln>
+            <a:solidFill>
+              <a:schemeClr val="tx1"/>
+            </a:solidFill>
+          </a:ln>
+          <a:effectLst/>
+        </p:spPr>
+        <p:txBody>
+          <a:bodyPr wrap="square" lIns="91440" tIns="45720" rIns="91440" bIns="45720">
+            <a:noAutofit/>
+          </a:bodyPr>
+          <a:lstStyle/>
+          <a:p>
+            <a:pPr algn="ctr"/>
+            <a:r>
+              <a:rPr lang="en-US" sz="3200" b="1" cap="none" spc="0" dirty="0" smtClean="0">
+                <a:ln w="12700">
+                  <a:solidFill>
+                    <a:schemeClr val="tx2">
+                      <a:satMod val="155000"/>
+                    </a:schemeClr>
+                  </a:solidFill>
+                  <a:prstDash val="solid"/>
+                </a:ln>
+                <a:solidFill>
+                  <a:srgbClr val="FFFF00"/>
+                </a:solidFill>
+                <a:effectLst>
+                  <a:outerShdw blurRad="41275" dist="20320" dir="1800000" algn="tl" rotWithShape="0">
+                    <a:srgbClr val="000000">
+                      <a:alpha val="40000"/>
+                    </a:srgbClr>
+                  </a:outerShdw>
+                </a:effectLst>
+              </a:rPr>
+              <a:t>string</a:t>
+            </a:r>
+            <a:endParaRPr lang="en-US" sz="3200" b="1" cap="none" spc="0" dirty="0">
+              <a:ln w="12700">
+                <a:solidFill>
+                  <a:schemeClr val="tx2">
+                    <a:satMod val="155000"/>
+                  </a:schemeClr>
+                </a:solidFill>
+                <a:prstDash val="solid"/>
+              </a:ln>
+              <a:solidFill>
+                <a:srgbClr val="FFFF00"/>
+              </a:solidFill>
+              <a:effectLst>
+                <a:outerShdw blurRad="41275" dist="20320" dir="1800000" algn="tl" rotWithShape="0">
+                  <a:srgbClr val="000000">
+                    <a:alpha val="40000"/>
+                  </a:srgbClr>
+                </a:outerShdw>
+              </a:effectLst>
+            </a:endParaRPr>
+          </a:p>
+        </p:txBody>
+      </p:sp>
+      <p:sp>
+        <p:nvSpPr>
+          <p:cNvPr id="53" name="Rectangle 52"/>
+          <p:cNvSpPr/>
+          <p:nvPr/>
+        </p:nvSpPr>
+        <p:spPr>
+          <a:xfrm>
+            <a:off x="5903293" y="5243742"/>
+            <a:ext cx="1411907" cy="584775"/>
+          </a:xfrm>
+          <a:prstGeom prst="rect">
+            <a:avLst/>
+          </a:prstGeom>
+          <a:solidFill>
+            <a:schemeClr val="accent4">
+              <a:lumMod val="60000"/>
+              <a:lumOff val="40000"/>
+            </a:schemeClr>
+          </a:solidFill>
+          <a:ln>
+            <a:solidFill>
+              <a:schemeClr val="tx1"/>
+            </a:solidFill>
+          </a:ln>
+          <a:effectLst/>
+        </p:spPr>
+        <p:txBody>
+          <a:bodyPr wrap="square" lIns="91440" tIns="45720" rIns="91440" bIns="45720">
+            <a:noAutofit/>
+          </a:bodyPr>
+          <a:lstStyle/>
+          <a:p>
+            <a:pPr algn="ctr"/>
+            <a:r>
+              <a:rPr lang="en-US" sz="3200" b="1" cap="none" spc="0" dirty="0" smtClean="0">
+                <a:ln w="12700">
+                  <a:solidFill>
+                    <a:schemeClr val="tx2">
+                      <a:satMod val="155000"/>
+                    </a:schemeClr>
+                  </a:solidFill>
+                  <a:prstDash val="solid"/>
+                </a:ln>
+                <a:solidFill>
+                  <a:srgbClr val="FFFF00"/>
+                </a:solidFill>
+                <a:effectLst>
+                  <a:outerShdw blurRad="41275" dist="20320" dir="1800000" algn="tl" rotWithShape="0">
+                    <a:srgbClr val="000000">
+                      <a:alpha val="40000"/>
+                    </a:srgbClr>
+                  </a:outerShdw>
+                </a:effectLst>
+              </a:rPr>
+              <a:t>double</a:t>
+            </a:r>
+            <a:endParaRPr lang="en-US" sz="3200" b="1" cap="none" spc="0" dirty="0">
+              <a:ln w="12700">
+                <a:solidFill>
+                  <a:schemeClr val="tx2">
+                    <a:satMod val="155000"/>
+                  </a:schemeClr>
+                </a:solidFill>
+                <a:prstDash val="solid"/>
+              </a:ln>
+              <a:solidFill>
+                <a:srgbClr val="FFFF00"/>
+              </a:solidFill>
+              <a:effectLst>
+                <a:outerShdw blurRad="41275" dist="20320" dir="1800000" algn="tl" rotWithShape="0">
+                  <a:srgbClr val="000000">
+                    <a:alpha val="40000"/>
+                  </a:srgbClr>
+                </a:outerShdw>
+              </a:effectLst>
+            </a:endParaRPr>
+          </a:p>
+        </p:txBody>
+      </p:sp>
+      <p:sp>
+        <p:nvSpPr>
+          <p:cNvPr id="54" name="Rectangle 53"/>
+          <p:cNvSpPr/>
+          <p:nvPr/>
+        </p:nvSpPr>
+        <p:spPr>
+          <a:xfrm>
+            <a:off x="2587145" y="5980919"/>
+            <a:ext cx="1130206" cy="584775"/>
+          </a:xfrm>
+          <a:prstGeom prst="rect">
+            <a:avLst/>
+          </a:prstGeom>
+          <a:solidFill>
+            <a:schemeClr val="accent4">
+              <a:lumMod val="75000"/>
+            </a:schemeClr>
+          </a:solidFill>
+          <a:ln>
+            <a:solidFill>
+              <a:schemeClr val="tx1"/>
+            </a:solidFill>
+          </a:ln>
+          <a:effectLst/>
+        </p:spPr>
+        <p:txBody>
+          <a:bodyPr wrap="square" lIns="91440" tIns="45720" rIns="91440" bIns="45720">
+            <a:noAutofit/>
+          </a:bodyPr>
+          <a:lstStyle/>
+          <a:p>
+            <a:pPr algn="ctr"/>
+            <a:r>
+              <a:rPr lang="en-US" sz="3200" b="1" dirty="0" err="1">
+                <a:ln w="12700">
+                  <a:solidFill>
+                    <a:schemeClr val="tx2">
+                      <a:satMod val="155000"/>
+                    </a:schemeClr>
+                  </a:solidFill>
+                  <a:prstDash val="solid"/>
+                </a:ln>
+                <a:solidFill>
+                  <a:srgbClr val="FFFF00"/>
+                </a:solidFill>
+                <a:effectLst>
+                  <a:outerShdw blurRad="41275" dist="20320" dir="1800000" algn="tl" rotWithShape="0">
+                    <a:srgbClr val="000000">
+                      <a:alpha val="40000"/>
+                    </a:srgbClr>
+                  </a:outerShdw>
+                </a:effectLst>
+              </a:rPr>
+              <a:t>i</a:t>
+            </a:r>
+            <a:r>
+              <a:rPr lang="en-US" sz="3200" b="1" cap="none" spc="0" dirty="0" err="1" smtClean="0">
+                <a:ln w="12700">
+                  <a:solidFill>
+                    <a:schemeClr val="tx2">
+                      <a:satMod val="155000"/>
+                    </a:schemeClr>
+                  </a:solidFill>
+                  <a:prstDash val="solid"/>
+                </a:ln>
+                <a:solidFill>
+                  <a:srgbClr val="FFFF00"/>
+                </a:solidFill>
+                <a:effectLst>
+                  <a:outerShdw blurRad="41275" dist="20320" dir="1800000" algn="tl" rotWithShape="0">
+                    <a:srgbClr val="000000">
+                      <a:alpha val="40000"/>
+                    </a:srgbClr>
+                  </a:outerShdw>
+                </a:effectLst>
+              </a:rPr>
+              <a:t>nt</a:t>
+            </a:r>
+            <a:r>
+              <a:rPr lang="en-US" sz="3200" b="1" cap="none" spc="0" dirty="0" smtClean="0">
+                <a:ln w="12700">
+                  <a:solidFill>
+                    <a:schemeClr val="tx2">
+                      <a:satMod val="155000"/>
+                    </a:schemeClr>
+                  </a:solidFill>
+                  <a:prstDash val="solid"/>
+                </a:ln>
+                <a:solidFill>
+                  <a:srgbClr val="FFFF00"/>
+                </a:solidFill>
+                <a:effectLst>
+                  <a:outerShdw blurRad="41275" dist="20320" dir="1800000" algn="tl" rotWithShape="0">
+                    <a:srgbClr val="000000">
+                      <a:alpha val="40000"/>
+                    </a:srgbClr>
+                  </a:outerShdw>
+                </a:effectLst>
+              </a:rPr>
+              <a:t>[]</a:t>
+            </a:r>
+            <a:endParaRPr lang="en-US" sz="3200" b="1" cap="none" spc="0" dirty="0">
+              <a:ln w="12700">
+                <a:solidFill>
+                  <a:schemeClr val="tx2">
+                    <a:satMod val="155000"/>
+                  </a:schemeClr>
+                </a:solidFill>
+                <a:prstDash val="solid"/>
+              </a:ln>
+              <a:solidFill>
+                <a:srgbClr val="FFFF00"/>
+              </a:solidFill>
+              <a:effectLst>
+                <a:outerShdw blurRad="41275" dist="20320" dir="1800000" algn="tl" rotWithShape="0">
+                  <a:srgbClr val="000000">
+                    <a:alpha val="40000"/>
+                  </a:srgbClr>
+                </a:outerShdw>
+              </a:effectLst>
+            </a:endParaRPr>
+          </a:p>
+        </p:txBody>
+      </p:sp>
+      <p:sp>
+        <p:nvSpPr>
+          <p:cNvPr id="55" name="Rectangle 54"/>
+          <p:cNvSpPr/>
+          <p:nvPr/>
+        </p:nvSpPr>
+        <p:spPr>
+          <a:xfrm>
+            <a:off x="5903293" y="5968425"/>
+            <a:ext cx="1716707" cy="584775"/>
+          </a:xfrm>
+          <a:prstGeom prst="rect">
+            <a:avLst/>
+          </a:prstGeom>
+          <a:solidFill>
+            <a:schemeClr val="accent4">
+              <a:lumMod val="75000"/>
+            </a:schemeClr>
+          </a:solidFill>
+          <a:ln>
+            <a:solidFill>
+              <a:schemeClr val="tx1"/>
+            </a:solidFill>
+          </a:ln>
+          <a:effectLst/>
+        </p:spPr>
+        <p:txBody>
+          <a:bodyPr wrap="square" lIns="91440" tIns="45720" rIns="91440" bIns="45720">
+            <a:noAutofit/>
+          </a:bodyPr>
+          <a:lstStyle/>
+          <a:p>
+            <a:pPr algn="ctr"/>
+            <a:r>
+              <a:rPr lang="en-US" sz="3200" b="1" dirty="0">
+                <a:ln w="12700">
+                  <a:solidFill>
+                    <a:schemeClr val="tx2">
+                      <a:satMod val="155000"/>
+                    </a:schemeClr>
+                  </a:solidFill>
+                  <a:prstDash val="solid"/>
+                </a:ln>
+                <a:solidFill>
+                  <a:srgbClr val="FFFF00"/>
+                </a:solidFill>
+                <a:effectLst>
+                  <a:outerShdw blurRad="41275" dist="20320" dir="1800000" algn="tl" rotWithShape="0">
+                    <a:srgbClr val="000000">
+                      <a:alpha val="40000"/>
+                    </a:srgbClr>
+                  </a:outerShdw>
+                </a:effectLst>
+              </a:rPr>
+              <a:t>d</a:t>
+            </a:r>
+            <a:r>
+              <a:rPr lang="en-US" sz="3200" b="1" cap="none" spc="0" dirty="0" smtClean="0">
+                <a:ln w="12700">
+                  <a:solidFill>
+                    <a:schemeClr val="tx2">
+                      <a:satMod val="155000"/>
+                    </a:schemeClr>
+                  </a:solidFill>
+                  <a:prstDash val="solid"/>
+                </a:ln>
+                <a:solidFill>
+                  <a:srgbClr val="FFFF00"/>
+                </a:solidFill>
+                <a:effectLst>
+                  <a:outerShdw blurRad="41275" dist="20320" dir="1800000" algn="tl" rotWithShape="0">
+                    <a:srgbClr val="000000">
+                      <a:alpha val="40000"/>
+                    </a:srgbClr>
+                  </a:outerShdw>
+                </a:effectLst>
+              </a:rPr>
+              <a:t>ouble[]</a:t>
+            </a:r>
+            <a:endParaRPr lang="en-US" sz="3200" b="1" cap="none" spc="0" dirty="0">
+              <a:ln w="12700">
+                <a:solidFill>
+                  <a:schemeClr val="tx2">
+                    <a:satMod val="155000"/>
+                  </a:schemeClr>
+                </a:solidFill>
+                <a:prstDash val="solid"/>
+              </a:ln>
+              <a:solidFill>
+                <a:srgbClr val="FFFF00"/>
+              </a:solidFill>
+              <a:effectLst>
+                <a:outerShdw blurRad="41275" dist="20320" dir="1800000" algn="tl" rotWithShape="0">
+                  <a:srgbClr val="000000">
+                    <a:alpha val="40000"/>
+                  </a:srgbClr>
+                </a:outerShdw>
+              </a:effectLst>
+            </a:endParaRPr>
+          </a:p>
+        </p:txBody>
+      </p:sp>
+    </p:spTree>
+    <p:extLst>
+      <p:ext uri="{BB962C8B-B14F-4D97-AF65-F5344CB8AC3E}">
+        <p14:creationId xmlns:p14="http://schemas.microsoft.com/office/powerpoint/2010/main" val="1122689913"/>
       </p:ext>
     </p:extLst>
   </p:cSld>

</xml_diff>